<commit_message>
Check-in of reviewed paper and PowerPoint
</commit_message>
<xml_diff>
--- a/DS749 Project_Team 4_Blockchain Analysis.pptx
+++ b/DS749 Project_Team 4_Blockchain Analysis.pptx
@@ -11,12 +11,12 @@
     <p:sldId id="256" r:id="rId2"/>
     <p:sldId id="298" r:id="rId3"/>
     <p:sldId id="300" r:id="rId4"/>
-    <p:sldId id="311" r:id="rId5"/>
-    <p:sldId id="301" r:id="rId6"/>
-    <p:sldId id="302" r:id="rId7"/>
-    <p:sldId id="303" r:id="rId8"/>
-    <p:sldId id="304" r:id="rId9"/>
-    <p:sldId id="305" r:id="rId10"/>
+    <p:sldId id="301" r:id="rId5"/>
+    <p:sldId id="302" r:id="rId6"/>
+    <p:sldId id="303" r:id="rId7"/>
+    <p:sldId id="304" r:id="rId8"/>
+    <p:sldId id="305" r:id="rId9"/>
+    <p:sldId id="311" r:id="rId10"/>
     <p:sldId id="306" r:id="rId11"/>
     <p:sldId id="307" r:id="rId12"/>
     <p:sldId id="310" r:id="rId13"/>
@@ -507,6 +507,236 @@
     </a:lvl9pPr>
   </p:notesStyle>
 </p:notesMaster>
+</file>
+
+<file path=ppt/notesSlides/notesSlide1.xml><?xml version="1.0" encoding="utf-8"?>
+<p:notes xmlns:a="http://schemas.openxmlformats.org/drawingml/2006/main" xmlns:r="http://schemas.openxmlformats.org/officeDocument/2006/relationships" xmlns:p="http://schemas.openxmlformats.org/presentationml/2006/main">
+  <p:cSld>
+    <p:spTree>
+      <p:nvGrpSpPr>
+        <p:cNvPr id="1" name=""/>
+        <p:cNvGrpSpPr/>
+        <p:nvPr/>
+      </p:nvGrpSpPr>
+      <p:grpSpPr>
+        <a:xfrm>
+          <a:off x="0" y="0"/>
+          <a:ext cx="0" cy="0"/>
+          <a:chOff x="0" y="0"/>
+          <a:chExt cx="0" cy="0"/>
+        </a:xfrm>
+      </p:grpSpPr>
+      <p:sp>
+        <p:nvSpPr>
+          <p:cNvPr id="2" name="Slide Image Placeholder 1"/>
+          <p:cNvSpPr>
+            <a:spLocks noGrp="1" noRot="1" noChangeAspect="1"/>
+          </p:cNvSpPr>
+          <p:nvPr>
+            <p:ph type="sldImg"/>
+          </p:nvPr>
+        </p:nvSpPr>
+        <p:spPr/>
+      </p:sp>
+      <p:sp>
+        <p:nvSpPr>
+          <p:cNvPr id="3" name="Notes Placeholder 2"/>
+          <p:cNvSpPr>
+            <a:spLocks noGrp="1"/>
+          </p:cNvSpPr>
+          <p:nvPr>
+            <p:ph type="body" idx="1"/>
+          </p:nvPr>
+        </p:nvSpPr>
+        <p:spPr/>
+        <p:txBody>
+          <a:bodyPr/>
+          <a:lstStyle/>
+          <a:p>
+            <a:pPr marL="285750" indent="-285750">
+              <a:buFont typeface="Arial" panose="020B0604020202020204" pitchFamily="34" charset="0"/>
+              <a:buChar char="•"/>
+            </a:pPr>
+            <a:r>
+              <a:rPr lang="en-US" sz="3000" dirty="0"/>
+              <a:t>For our demo we will show an implementation of a Blockchain Database called </a:t>
+            </a:r>
+            <a:r>
+              <a:rPr lang="en-US" sz="3000" dirty="0" err="1"/>
+              <a:t>BigchainDB</a:t>
+            </a:r>
+            <a:r>
+              <a:rPr lang="en-US" sz="3000" dirty="0"/>
+              <a:t>.</a:t>
+            </a:r>
+          </a:p>
+          <a:p>
+            <a:pPr marL="285750" indent="-285750">
+              <a:buFont typeface="Arial" panose="020B0604020202020204" pitchFamily="34" charset="0"/>
+              <a:buChar char="•"/>
+            </a:pPr>
+            <a:endParaRPr lang="en-US" sz="3000" dirty="0"/>
+          </a:p>
+          <a:p>
+            <a:pPr marL="285750" indent="-285750">
+              <a:buFont typeface="Arial" panose="020B0604020202020204" pitchFamily="34" charset="0"/>
+              <a:buChar char="•"/>
+            </a:pPr>
+            <a:r>
+              <a:rPr lang="en-US" sz="3000" dirty="0" err="1"/>
+              <a:t>BigchainDB</a:t>
+            </a:r>
+            <a:r>
+              <a:rPr lang="en-US" sz="3000" dirty="0"/>
+              <a:t> Features:</a:t>
+            </a:r>
+          </a:p>
+          <a:p>
+            <a:pPr marL="742950" lvl="1" indent="-285750">
+              <a:buFont typeface="Arial" panose="020B0604020202020204" pitchFamily="34" charset="0"/>
+              <a:buChar char="•"/>
+            </a:pPr>
+            <a:r>
+              <a:rPr lang="en-US" sz="3000" dirty="0"/>
+              <a:t>Decentralized Control</a:t>
+            </a:r>
+          </a:p>
+          <a:p>
+            <a:pPr marL="1200150" lvl="2" indent="-285750">
+              <a:buFont typeface="Arial" panose="020B0604020202020204" pitchFamily="34" charset="0"/>
+              <a:buChar char="•"/>
+            </a:pPr>
+            <a:r>
+              <a:rPr lang="en-US" sz="3000" dirty="0"/>
+              <a:t>Network of peer nodes ensure trust and accountability</a:t>
+            </a:r>
+          </a:p>
+          <a:p>
+            <a:pPr marL="742950" lvl="1" indent="-285750">
+              <a:buFont typeface="Arial" panose="020B0604020202020204" pitchFamily="34" charset="0"/>
+              <a:buChar char="•"/>
+            </a:pPr>
+            <a:r>
+              <a:rPr lang="en-US" sz="3000" dirty="0"/>
+              <a:t>Transaction Immutability</a:t>
+            </a:r>
+          </a:p>
+          <a:p>
+            <a:pPr marL="1200150" lvl="2" indent="-285750">
+              <a:buFont typeface="Arial" panose="020B0604020202020204" pitchFamily="34" charset="0"/>
+              <a:buChar char="•"/>
+            </a:pPr>
+            <a:r>
+              <a:rPr lang="en-US" sz="3000" dirty="0"/>
+              <a:t>Transactions cannot be changed after they are committed to the decentralized network</a:t>
+            </a:r>
+          </a:p>
+          <a:p>
+            <a:pPr marL="742950" lvl="1" indent="-285750">
+              <a:buFont typeface="Arial" panose="020B0604020202020204" pitchFamily="34" charset="0"/>
+              <a:buChar char="•"/>
+            </a:pPr>
+            <a:r>
+              <a:rPr lang="en-US" sz="3000" dirty="0"/>
+              <a:t>Standard Queries</a:t>
+            </a:r>
+          </a:p>
+          <a:p>
+            <a:pPr marL="1200150" lvl="2" indent="-285750">
+              <a:buFont typeface="Arial" panose="020B0604020202020204" pitchFamily="34" charset="0"/>
+              <a:buChar char="•"/>
+            </a:pPr>
+            <a:r>
+              <a:rPr lang="en-US" sz="3000" dirty="0"/>
+              <a:t>MongoDB query engine to access stored transaction and asset data</a:t>
+            </a:r>
+          </a:p>
+          <a:p>
+            <a:pPr marL="742950" lvl="1" indent="-285750">
+              <a:buFont typeface="Arial" panose="020B0604020202020204" pitchFamily="34" charset="0"/>
+              <a:buChar char="•"/>
+            </a:pPr>
+            <a:r>
+              <a:rPr lang="en-US" sz="3000" dirty="0"/>
+              <a:t>Fast Commits</a:t>
+            </a:r>
+          </a:p>
+          <a:p>
+            <a:pPr marL="1200150" lvl="2" indent="-285750">
+              <a:buFont typeface="Arial" panose="020B0604020202020204" pitchFamily="34" charset="0"/>
+              <a:buChar char="•"/>
+            </a:pPr>
+            <a:r>
+              <a:rPr lang="en-US" sz="3000" dirty="0"/>
+              <a:t>Ranges from a few milliseconds to a few seconds to enable use in fast-paced areas, such as stock trading.</a:t>
+            </a:r>
+          </a:p>
+          <a:p>
+            <a:pPr marL="742950" lvl="1" indent="-285750">
+              <a:buFont typeface="Arial" panose="020B0604020202020204" pitchFamily="34" charset="0"/>
+              <a:buChar char="•"/>
+            </a:pPr>
+            <a:r>
+              <a:rPr lang="en-US" sz="3000" dirty="0"/>
+              <a:t>Sybil Tolerance</a:t>
+            </a:r>
+          </a:p>
+          <a:p>
+            <a:pPr marL="1200150" lvl="2" indent="-285750">
+              <a:buFont typeface="Arial" panose="020B0604020202020204" pitchFamily="34" charset="0"/>
+              <a:buChar char="•"/>
+            </a:pPr>
+            <a:r>
+              <a:rPr lang="en-US" sz="3000" dirty="0"/>
+              <a:t>Minimizes false nodes (Sybils) on a network using a governing authority to approve all requests.</a:t>
+            </a:r>
+          </a:p>
+          <a:p>
+            <a:pPr marL="285750" indent="-285750">
+              <a:buFont typeface="Arial" panose="020B0604020202020204" pitchFamily="34" charset="0"/>
+              <a:buChar char="•"/>
+            </a:pPr>
+            <a:endParaRPr lang="en-US" sz="3000" dirty="0"/>
+          </a:p>
+          <a:p>
+            <a:endParaRPr lang="en-US" dirty="0"/>
+          </a:p>
+        </p:txBody>
+      </p:sp>
+      <p:sp>
+        <p:nvSpPr>
+          <p:cNvPr id="4" name="Slide Number Placeholder 3"/>
+          <p:cNvSpPr>
+            <a:spLocks noGrp="1"/>
+          </p:cNvSpPr>
+          <p:nvPr>
+            <p:ph type="sldNum" sz="quarter" idx="5"/>
+          </p:nvPr>
+        </p:nvSpPr>
+        <p:spPr/>
+        <p:txBody>
+          <a:bodyPr/>
+          <a:lstStyle/>
+          <a:p>
+            <a:fld id="{BE60DC36-8EFA-4378-9855-E019C55AC472}" type="slidenum">
+              <a:rPr lang="en-US" smtClean="0"/>
+              <a:t>10</a:t>
+            </a:fld>
+            <a:endParaRPr lang="en-US" dirty="0"/>
+          </a:p>
+        </p:txBody>
+      </p:sp>
+    </p:spTree>
+    <p:extLst>
+      <p:ext uri="{BB962C8B-B14F-4D97-AF65-F5344CB8AC3E}">
+        <p14:creationId xmlns:p14="http://schemas.microsoft.com/office/powerpoint/2010/main" val="2599048130"/>
+      </p:ext>
+    </p:extLst>
+  </p:cSld>
+  <p:clrMapOvr>
+    <a:masterClrMapping/>
+  </p:clrMapOvr>
+</p:notes>
 </file>
 
 <file path=ppt/slideLayouts/slideLayout1.xml><?xml version="1.0" encoding="utf-8"?>
@@ -3746,65 +3976,6 @@
       </p:grpSpPr>
       <p:sp>
         <p:nvSpPr>
-          <p:cNvPr id="2" name="Title 1">
-            <a:extLst>
-              <a:ext uri="{FF2B5EF4-FFF2-40B4-BE49-F238E27FC236}">
-                <a16:creationId xmlns:a16="http://schemas.microsoft.com/office/drawing/2014/main" id="{C4300AEF-1595-4419-801B-6E36A33BB8CF}"/>
-              </a:ext>
-            </a:extLst>
-          </p:cNvPr>
-          <p:cNvSpPr>
-            <a:spLocks noGrp="1"/>
-          </p:cNvSpPr>
-          <p:nvPr>
-            <p:ph type="ctrTitle"/>
-          </p:nvPr>
-        </p:nvSpPr>
-        <p:spPr>
-          <a:xfrm>
-            <a:off x="1448499" y="2463346"/>
-            <a:ext cx="9144000" cy="2215991"/>
-          </a:xfrm>
-        </p:spPr>
-        <p:txBody>
-          <a:bodyPr lIns="0" tIns="0" rIns="0" bIns="0" anchor="t">
-            <a:spAutoFit/>
-          </a:bodyPr>
-          <a:lstStyle/>
-          <a:p>
-            <a:r>
-              <a:rPr lang="en-US" b="1" dirty="0">
-                <a:solidFill>
-                  <a:schemeClr val="bg1"/>
-                </a:solidFill>
-              </a:rPr>
-              <a:t>Blockchain Analysis (April 2019)</a:t>
-            </a:r>
-            <a:br>
-              <a:rPr lang="en-US" dirty="0">
-                <a:solidFill>
-                  <a:schemeClr val="bg1"/>
-                </a:solidFill>
-              </a:rPr>
-            </a:br>
-            <a:r>
-              <a:rPr lang="en-US" sz="4000" dirty="0">
-                <a:solidFill>
-                  <a:schemeClr val="accent4"/>
-                </a:solidFill>
-              </a:rPr>
-              <a:t>Presentation</a:t>
-            </a:r>
-            <a:endParaRPr lang="en-US" dirty="0">
-              <a:solidFill>
-                <a:schemeClr val="accent4"/>
-              </a:solidFill>
-            </a:endParaRPr>
-          </a:p>
-        </p:txBody>
-      </p:sp>
-      <p:sp>
-        <p:nvSpPr>
           <p:cNvPr id="4" name="Diamond 3">
             <a:extLst>
               <a:ext uri="{FF2B5EF4-FFF2-40B4-BE49-F238E27FC236}">
@@ -3820,7 +3991,7 @@
         </p:nvSpPr>
         <p:spPr>
           <a:xfrm>
-            <a:off x="4792319" y="-608242"/>
+            <a:off x="4792318" y="2463346"/>
             <a:ext cx="2607364" cy="2607364"/>
           </a:xfrm>
           <a:prstGeom prst="diamond">
@@ -3875,7 +4046,7 @@
         </p:nvSpPr>
         <p:spPr>
           <a:xfrm>
-            <a:off x="4325258" y="-1770743"/>
+            <a:off x="4325257" y="1300845"/>
             <a:ext cx="3541486" cy="3541486"/>
           </a:xfrm>
           <a:prstGeom prst="diamond">
@@ -3910,6 +4081,57 @@
           <a:p>
             <a:pPr algn="ctr"/>
             <a:endParaRPr lang="en-US" dirty="0"/>
+          </a:p>
+        </p:txBody>
+      </p:sp>
+      <p:sp>
+        <p:nvSpPr>
+          <p:cNvPr id="2" name="Title 1">
+            <a:extLst>
+              <a:ext uri="{FF2B5EF4-FFF2-40B4-BE49-F238E27FC236}">
+                <a16:creationId xmlns:a16="http://schemas.microsoft.com/office/drawing/2014/main" id="{C4300AEF-1595-4419-801B-6E36A33BB8CF}"/>
+              </a:ext>
+            </a:extLst>
+          </p:cNvPr>
+          <p:cNvSpPr>
+            <a:spLocks noGrp="1"/>
+          </p:cNvSpPr>
+          <p:nvPr>
+            <p:ph type="ctrTitle"/>
+          </p:nvPr>
+        </p:nvSpPr>
+        <p:spPr>
+          <a:xfrm>
+            <a:off x="1448499" y="2463346"/>
+            <a:ext cx="9144000" cy="2492990"/>
+          </a:xfrm>
+        </p:spPr>
+        <p:txBody>
+          <a:bodyPr lIns="0" tIns="0" rIns="0" bIns="0" anchor="t">
+            <a:spAutoFit/>
+          </a:bodyPr>
+          <a:lstStyle/>
+          <a:p>
+            <a:r>
+              <a:rPr lang="en-US" b="1" dirty="0">
+                <a:solidFill>
+                  <a:schemeClr val="bg1"/>
+                </a:solidFill>
+              </a:rPr>
+              <a:t>Blockchain Analysis (April 2019)</a:t>
+            </a:r>
+            <a:br>
+              <a:rPr lang="en-US" dirty="0">
+                <a:solidFill>
+                  <a:schemeClr val="bg1"/>
+                </a:solidFill>
+              </a:rPr>
+            </a:br>
+            <a:endParaRPr lang="en-US" dirty="0">
+              <a:solidFill>
+                <a:schemeClr val="accent4"/>
+              </a:solidFill>
+            </a:endParaRPr>
           </a:p>
         </p:txBody>
       </p:sp>
@@ -4115,8 +4337,8 @@
         </p:nvSpPr>
         <p:spPr>
           <a:xfrm>
-            <a:off x="228600" y="-3399"/>
-            <a:ext cx="11734800" cy="1163395"/>
+            <a:off x="228600" y="-17249"/>
+            <a:ext cx="11734800" cy="1191095"/>
           </a:xfrm>
           <a:prstGeom prst="rect">
             <a:avLst/>
@@ -4159,7 +4381,7 @@
           <a:p>
             <a:pPr algn="ctr"/>
             <a:r>
-              <a:rPr lang="en-US" sz="2800" b="1" dirty="0" err="1">
+              <a:rPr lang="en-US" sz="3000" b="1" dirty="0" err="1">
                 <a:solidFill>
                   <a:schemeClr val="tx1">
                     <a:lumMod val="75000"/>
@@ -4254,7 +4476,7 @@
         <p:spPr>
           <a:xfrm>
             <a:off x="228601" y="1159996"/>
-            <a:ext cx="11734800" cy="5509200"/>
+            <a:ext cx="11734800" cy="4708981"/>
           </a:xfrm>
           <a:prstGeom prst="rect">
             <a:avLst/>
@@ -4272,15 +4494,15 @@
               <a:buChar char="•"/>
             </a:pPr>
             <a:r>
-              <a:rPr lang="en-US" sz="2200" dirty="0"/>
+              <a:rPr lang="en-US" sz="3000" dirty="0"/>
               <a:t>For our demo we will show an implementation of a Blockchain Database called </a:t>
             </a:r>
             <a:r>
-              <a:rPr lang="en-US" sz="2200" dirty="0" err="1"/>
+              <a:rPr lang="en-US" sz="3000" dirty="0" err="1"/>
               <a:t>BigchainDB</a:t>
             </a:r>
             <a:r>
-              <a:rPr lang="en-US" sz="2200" dirty="0"/>
+              <a:rPr lang="en-US" sz="3000" dirty="0"/>
               <a:t>.</a:t>
             </a:r>
           </a:p>
@@ -4289,7 +4511,7 @@
               <a:buFont typeface="Arial" panose="020B0604020202020204" pitchFamily="34" charset="0"/>
               <a:buChar char="•"/>
             </a:pPr>
-            <a:endParaRPr lang="en-US" sz="2200" dirty="0"/>
+            <a:endParaRPr lang="en-US" sz="3000" dirty="0"/>
           </a:p>
           <a:p>
             <a:pPr marL="285750" indent="-285750">
@@ -4297,11 +4519,11 @@
               <a:buChar char="•"/>
             </a:pPr>
             <a:r>
-              <a:rPr lang="en-US" sz="2200" dirty="0" err="1"/>
+              <a:rPr lang="en-US" sz="3000" dirty="0" err="1"/>
               <a:t>BigchainDB</a:t>
             </a:r>
             <a:r>
-              <a:rPr lang="en-US" sz="2200" dirty="0"/>
+              <a:rPr lang="en-US" sz="3000" dirty="0"/>
               <a:t> Features:</a:t>
             </a:r>
           </a:p>
@@ -4311,18 +4533,8 @@
               <a:buChar char="•"/>
             </a:pPr>
             <a:r>
-              <a:rPr lang="en-US" sz="2200" dirty="0"/>
+              <a:rPr lang="en-US" sz="3000" dirty="0"/>
               <a:t>Decentralized Control</a:t>
-            </a:r>
-          </a:p>
-          <a:p>
-            <a:pPr marL="1200150" lvl="2" indent="-285750">
-              <a:buFont typeface="Arial" panose="020B0604020202020204" pitchFamily="34" charset="0"/>
-              <a:buChar char="•"/>
-            </a:pPr>
-            <a:r>
-              <a:rPr lang="en-US" sz="2200" dirty="0"/>
-              <a:t>Network of peer nodes ensure trust and accountability</a:t>
             </a:r>
           </a:p>
           <a:p>
@@ -4331,18 +4543,8 @@
               <a:buChar char="•"/>
             </a:pPr>
             <a:r>
-              <a:rPr lang="en-US" sz="2200" dirty="0"/>
+              <a:rPr lang="en-US" sz="3000" dirty="0"/>
               <a:t>Transaction Immutability</a:t>
-            </a:r>
-          </a:p>
-          <a:p>
-            <a:pPr marL="1200150" lvl="2" indent="-285750">
-              <a:buFont typeface="Arial" panose="020B0604020202020204" pitchFamily="34" charset="0"/>
-              <a:buChar char="•"/>
-            </a:pPr>
-            <a:r>
-              <a:rPr lang="en-US" sz="2200" dirty="0"/>
-              <a:t>Transactions cannot be changed after they are committed to the decentralized network</a:t>
             </a:r>
           </a:p>
           <a:p>
@@ -4351,18 +4553,8 @@
               <a:buChar char="•"/>
             </a:pPr>
             <a:r>
-              <a:rPr lang="en-US" sz="2200" dirty="0"/>
+              <a:rPr lang="en-US" sz="3000" dirty="0"/>
               <a:t>Standard Queries</a:t>
-            </a:r>
-          </a:p>
-          <a:p>
-            <a:pPr marL="1200150" lvl="2" indent="-285750">
-              <a:buFont typeface="Arial" panose="020B0604020202020204" pitchFamily="34" charset="0"/>
-              <a:buChar char="•"/>
-            </a:pPr>
-            <a:r>
-              <a:rPr lang="en-US" sz="2200" dirty="0"/>
-              <a:t>MongoDB query engine to access stored transaction and asset data</a:t>
             </a:r>
           </a:p>
           <a:p>
@@ -4371,18 +4563,8 @@
               <a:buChar char="•"/>
             </a:pPr>
             <a:r>
-              <a:rPr lang="en-US" sz="2200" dirty="0"/>
+              <a:rPr lang="en-US" sz="3000" dirty="0"/>
               <a:t>Fast Commits</a:t>
-            </a:r>
-          </a:p>
-          <a:p>
-            <a:pPr marL="1200150" lvl="2" indent="-285750">
-              <a:buFont typeface="Arial" panose="020B0604020202020204" pitchFamily="34" charset="0"/>
-              <a:buChar char="•"/>
-            </a:pPr>
-            <a:r>
-              <a:rPr lang="en-US" sz="2200" dirty="0"/>
-              <a:t>Ranges from a few milliseconds to a few seconds to enable use in fast-paced areas, such as stock trading.</a:t>
             </a:r>
           </a:p>
           <a:p>
@@ -4391,26 +4573,12 @@
               <a:buChar char="•"/>
             </a:pPr>
             <a:r>
-              <a:rPr lang="en-US" sz="2200" dirty="0"/>
+              <a:rPr lang="en-US" sz="3000" dirty="0"/>
               <a:t>Sybil Tolerance</a:t>
             </a:r>
           </a:p>
           <a:p>
-            <a:pPr marL="1200150" lvl="2" indent="-285750">
-              <a:buFont typeface="Arial" panose="020B0604020202020204" pitchFamily="34" charset="0"/>
-              <a:buChar char="•"/>
-            </a:pPr>
-            <a:r>
-              <a:rPr lang="en-US" sz="2200" dirty="0"/>
-              <a:t>Minimizes false nodes (Sybils) on a network using a governing authority to approve all requests.</a:t>
-            </a:r>
-          </a:p>
-          <a:p>
-            <a:pPr marL="285750" indent="-285750">
-              <a:buFont typeface="Arial" panose="020B0604020202020204" pitchFamily="34" charset="0"/>
-              <a:buChar char="•"/>
-            </a:pPr>
-            <a:endParaRPr lang="en-US" sz="2200" dirty="0"/>
+            <a:endParaRPr lang="en-US" sz="3000" dirty="0"/>
           </a:p>
         </p:txBody>
       </p:sp>
@@ -4576,8 +4744,8 @@
         </p:nvSpPr>
         <p:spPr>
           <a:xfrm>
-            <a:off x="228600" y="-3399"/>
-            <a:ext cx="11734800" cy="1163395"/>
+            <a:off x="228600" y="-31099"/>
+            <a:ext cx="11734800" cy="1218795"/>
           </a:xfrm>
           <a:prstGeom prst="rect">
             <a:avLst/>
@@ -4620,7 +4788,7 @@
           <a:p>
             <a:pPr algn="ctr"/>
             <a:r>
-              <a:rPr lang="en-US" sz="2800" b="1" dirty="0" err="1">
+              <a:rPr lang="en-US" sz="3000" b="1" dirty="0" err="1">
                 <a:solidFill>
                   <a:schemeClr val="tx1">
                     <a:lumMod val="75000"/>
@@ -4631,7 +4799,7 @@
               <a:t>BigChainDB</a:t>
             </a:r>
             <a:r>
-              <a:rPr lang="en-US" sz="2800" b="1" dirty="0">
+              <a:rPr lang="en-US" sz="3000" b="1" dirty="0">
                 <a:solidFill>
                   <a:schemeClr val="tx1">
                     <a:lumMod val="75000"/>
@@ -4642,7 +4810,7 @@
               <a:t> Demo</a:t>
             </a:r>
             <a:br>
-              <a:rPr lang="en-US" sz="2800" dirty="0">
+              <a:rPr lang="en-US" sz="3000" dirty="0">
                 <a:solidFill>
                   <a:schemeClr val="tx1">
                     <a:lumMod val="75000"/>
@@ -4651,7 +4819,7 @@
                 </a:solidFill>
               </a:rPr>
             </a:br>
-            <a:endParaRPr lang="en-US" sz="2800" dirty="0">
+            <a:endParaRPr lang="en-US" sz="3000" dirty="0">
               <a:solidFill>
                 <a:schemeClr val="tx1">
                   <a:lumMod val="75000"/>
@@ -4726,7 +4894,7 @@
         <p:spPr>
           <a:xfrm>
             <a:off x="228601" y="1159996"/>
-            <a:ext cx="11734800" cy="2646878"/>
+            <a:ext cx="11734800" cy="3662541"/>
           </a:xfrm>
           <a:prstGeom prst="rect">
             <a:avLst/>
@@ -4744,57 +4912,60 @@
               <a:buChar char="•"/>
             </a:pPr>
             <a:r>
-              <a:rPr lang="en-US" sz="2400" dirty="0"/>
+              <a:rPr lang="en-US" sz="3000" dirty="0"/>
               <a:t>In this tutorial we cover:</a:t>
             </a:r>
           </a:p>
           <a:p>
-            <a:pPr marL="342900" lvl="0" indent="-342900">
+            <a:endParaRPr lang="en-US" sz="3000" dirty="0"/>
+          </a:p>
+          <a:p>
+            <a:pPr marL="800100" lvl="1" indent="-342900">
               <a:buFont typeface="Arial" panose="020B0604020202020204" pitchFamily="34" charset="0"/>
               <a:buChar char="•"/>
             </a:pPr>
             <a:r>
-              <a:rPr lang="en-US" sz="2400" dirty="0"/>
+              <a:rPr lang="en-US" sz="3000" dirty="0"/>
               <a:t>Creating User Identities</a:t>
             </a:r>
           </a:p>
           <a:p>
-            <a:pPr marL="342900" lvl="0" indent="-342900">
+            <a:pPr marL="800100" lvl="1" indent="-342900">
               <a:buFont typeface="Arial" panose="020B0604020202020204" pitchFamily="34" charset="0"/>
               <a:buChar char="•"/>
             </a:pPr>
             <a:r>
-              <a:rPr lang="en-US" sz="2400" dirty="0"/>
+              <a:rPr lang="en-US" sz="3000" dirty="0"/>
               <a:t>Creating Digital Assets</a:t>
             </a:r>
           </a:p>
           <a:p>
-            <a:pPr marL="342900" lvl="0" indent="-342900">
+            <a:pPr marL="800100" lvl="1" indent="-342900">
               <a:buFont typeface="Arial" panose="020B0604020202020204" pitchFamily="34" charset="0"/>
               <a:buChar char="•"/>
             </a:pPr>
             <a:r>
-              <a:rPr lang="en-US" sz="2400" dirty="0"/>
+              <a:rPr lang="en-US" sz="3000" dirty="0"/>
               <a:t>Assigning ownership to assets through a transaction</a:t>
             </a:r>
           </a:p>
           <a:p>
-            <a:pPr marL="342900" lvl="0" indent="-342900">
+            <a:pPr marL="800100" lvl="1" indent="-342900">
               <a:buFont typeface="Arial" panose="020B0604020202020204" pitchFamily="34" charset="0"/>
               <a:buChar char="•"/>
             </a:pPr>
             <a:r>
-              <a:rPr lang="en-US" sz="2400" dirty="0"/>
+              <a:rPr lang="en-US" sz="3000" dirty="0"/>
               <a:t>Transferring assets between two identities</a:t>
             </a:r>
           </a:p>
           <a:p>
-            <a:pPr marL="342900" lvl="0" indent="-342900">
+            <a:pPr marL="800100" lvl="1" indent="-342900">
               <a:buFont typeface="Arial" panose="020B0604020202020204" pitchFamily="34" charset="0"/>
               <a:buChar char="•"/>
             </a:pPr>
             <a:r>
-              <a:rPr lang="en-US" sz="2400" dirty="0"/>
+              <a:rPr lang="en-US" sz="3000" dirty="0"/>
               <a:t>Querying the blockchain for a record of these transactions</a:t>
             </a:r>
           </a:p>
@@ -5743,8 +5914,8 @@
         </p:nvSpPr>
         <p:spPr>
           <a:xfrm>
-            <a:off x="228600" y="-3399"/>
-            <a:ext cx="11734800" cy="1163395"/>
+            <a:off x="228600" y="-31099"/>
+            <a:ext cx="11734800" cy="1218795"/>
           </a:xfrm>
           <a:prstGeom prst="rect">
             <a:avLst/>
@@ -5787,7 +5958,7 @@
           <a:p>
             <a:pPr algn="ctr"/>
             <a:r>
-              <a:rPr lang="en-US" sz="2800" b="1" dirty="0">
+              <a:rPr lang="en-US" sz="3000" b="1" dirty="0">
                 <a:solidFill>
                   <a:schemeClr val="tx1">
                     <a:lumMod val="75000"/>
@@ -5798,7 +5969,7 @@
               <a:t>Blockchain Introduction</a:t>
             </a:r>
             <a:br>
-              <a:rPr lang="en-US" sz="2800" dirty="0">
+              <a:rPr lang="en-US" sz="3000" dirty="0">
                 <a:solidFill>
                   <a:schemeClr val="tx1">
                     <a:lumMod val="75000"/>
@@ -5807,7 +5978,7 @@
                 </a:solidFill>
               </a:rPr>
             </a:br>
-            <a:endParaRPr lang="en-US" sz="2800" dirty="0">
+            <a:endParaRPr lang="en-US" sz="3000" dirty="0">
               <a:solidFill>
                 <a:schemeClr val="tx1">
                   <a:lumMod val="75000"/>
@@ -5882,7 +6053,7 @@
         <p:spPr>
           <a:xfrm>
             <a:off x="228600" y="792839"/>
-            <a:ext cx="11364985" cy="5563511"/>
+            <a:ext cx="11364985" cy="5546327"/>
           </a:xfrm>
           <a:prstGeom prst="rect">
             <a:avLst/>
@@ -5903,8 +6074,8 @@
               <a:buChar char="•"/>
             </a:pPr>
             <a:r>
-              <a:rPr lang="en-US" sz="2400" dirty="0"/>
-              <a:t>Developed in 2008 by Satoshi Nakamoto (pseudonym, real identity unknown) for use with cryptocurrency, but can be anywhere that trust, privacy, resilience and security are necessities.</a:t>
+              <a:rPr lang="en-US" sz="3000" dirty="0"/>
+              <a:t>Developed in 2008 by Satoshi Nakamoto (pseudonym) for use with cryptocurrency called Bitcoin, but can be anywhere that trust, privacy, resilience and security are necessities.</a:t>
             </a:r>
           </a:p>
           <a:p>
@@ -5915,7 +6086,7 @@
               <a:buFont typeface="Arial" panose="020B0604020202020204" pitchFamily="34" charset="0"/>
               <a:buChar char="•"/>
             </a:pPr>
-            <a:endParaRPr lang="en-US" sz="2400" dirty="0"/>
+            <a:endParaRPr lang="en-US" sz="3000" dirty="0"/>
           </a:p>
           <a:p>
             <a:pPr marL="285750" indent="-285750">
@@ -5926,8 +6097,8 @@
               <a:buChar char="•"/>
             </a:pPr>
             <a:r>
-              <a:rPr lang="en-US" sz="2400" dirty="0"/>
-              <a:t>Blockchain is an unchangeable transaction log, aka digital ledger</a:t>
+              <a:rPr lang="en-US" sz="3000" dirty="0"/>
+              <a:t>Blockchain is an unchangeable transaction log, digital ledger.</a:t>
             </a:r>
           </a:p>
           <a:p>
@@ -5938,7 +6109,7 @@
               <a:buFont typeface="Arial" panose="020B0604020202020204" pitchFamily="34" charset="0"/>
               <a:buChar char="•"/>
             </a:pPr>
-            <a:endParaRPr lang="en-US" sz="2400" dirty="0"/>
+            <a:endParaRPr lang="en-US" sz="3000" dirty="0"/>
           </a:p>
           <a:p>
             <a:pPr marL="285750" indent="-285750">
@@ -5949,31 +6120,8 @@
               <a:buChar char="•"/>
             </a:pPr>
             <a:r>
-              <a:rPr lang="en-US" sz="2400" dirty="0"/>
-              <a:t>Blockchain is decentralized and public, relying on a community to ensure trust and accountability</a:t>
-            </a:r>
-          </a:p>
-          <a:p>
-            <a:pPr marL="285750" indent="-285750">
-              <a:lnSpc>
-                <a:spcPct val="150000"/>
-              </a:lnSpc>
-              <a:buFont typeface="Arial" panose="020B0604020202020204" pitchFamily="34" charset="0"/>
-              <a:buChar char="•"/>
-            </a:pPr>
-            <a:endParaRPr lang="en-US" sz="2400" dirty="0"/>
-          </a:p>
-          <a:p>
-            <a:pPr marL="285750" indent="-285750">
-              <a:lnSpc>
-                <a:spcPct val="150000"/>
-              </a:lnSpc>
-              <a:buFont typeface="Arial" panose="020B0604020202020204" pitchFamily="34" charset="0"/>
-              <a:buChar char="•"/>
-            </a:pPr>
-            <a:r>
-              <a:rPr lang="en-US" sz="2400" dirty="0"/>
-              <a:t>There are many types of blockchains (public, private, and federated)</a:t>
+              <a:rPr lang="en-US" sz="3000" dirty="0"/>
+              <a:t>Blockchain is decentralized and public, relying on a community to ensure trust and accountability.</a:t>
             </a:r>
           </a:p>
         </p:txBody>
@@ -6140,8 +6288,8 @@
         </p:nvSpPr>
         <p:spPr>
           <a:xfrm>
-            <a:off x="228600" y="-3399"/>
-            <a:ext cx="11734800" cy="1163395"/>
+            <a:off x="228600" y="-31099"/>
+            <a:ext cx="11734800" cy="1218795"/>
           </a:xfrm>
           <a:prstGeom prst="rect">
             <a:avLst/>
@@ -6184,7 +6332,7 @@
           <a:p>
             <a:pPr algn="ctr"/>
             <a:r>
-              <a:rPr lang="en-US" sz="2800" b="1" dirty="0">
+              <a:rPr lang="en-US" sz="3000" b="1" dirty="0">
                 <a:solidFill>
                   <a:schemeClr val="tx1">
                     <a:lumMod val="75000"/>
@@ -6192,10 +6340,10 @@
                   </a:schemeClr>
                 </a:solidFill>
               </a:rPr>
-              <a:t>History of Blockchain</a:t>
+              <a:t>Origins of Blockchain</a:t>
             </a:r>
             <a:br>
-              <a:rPr lang="en-US" sz="2800" dirty="0">
+              <a:rPr lang="en-US" sz="3000" dirty="0">
                 <a:solidFill>
                   <a:schemeClr val="tx1">
                     <a:lumMod val="75000"/>
@@ -6204,7 +6352,7 @@
                 </a:solidFill>
               </a:rPr>
             </a:br>
-            <a:endParaRPr lang="en-US" sz="2800" dirty="0">
+            <a:endParaRPr lang="en-US" sz="3000" dirty="0">
               <a:solidFill>
                 <a:schemeClr val="tx1">
                   <a:lumMod val="75000"/>
@@ -6279,7 +6427,7 @@
         <p:spPr>
           <a:xfrm>
             <a:off x="228600" y="985810"/>
-            <a:ext cx="11364985" cy="6123215"/>
+            <a:ext cx="11364985" cy="5546327"/>
           </a:xfrm>
           <a:prstGeom prst="rect">
             <a:avLst/>
@@ -6300,16 +6448,12 @@
               <a:buChar char="•"/>
             </a:pPr>
             <a:r>
-              <a:rPr lang="en-US" sz="2200" dirty="0"/>
-              <a:t>DES was developed in the early 1970s by IBM and Modified by NSA to make it </a:t>
-            </a:r>
-            <a:r>
-              <a:rPr lang="en-US" sz="2200" dirty="0" err="1"/>
-              <a:t>crackable</a:t>
-            </a:r>
-            <a:r>
-              <a:rPr lang="en-US" sz="2200" dirty="0"/>
-              <a:t>.</a:t>
+              <a:rPr lang="en-US" sz="3000" dirty="0"/>
+              <a:t>Technology based on “Blind Signatures” by David Chaum, which provided accountability but still relied on a third-party approver.</a:t>
+            </a:r>
+            <a:r>
+              <a:rPr lang="en-US" sz="3000" baseline="30000" dirty="0"/>
+              <a:t> [3]</a:t>
             </a:r>
           </a:p>
           <a:p>
@@ -6320,10 +6464,7 @@
               <a:buFont typeface="Arial" panose="020B0604020202020204" pitchFamily="34" charset="0"/>
               <a:buChar char="•"/>
             </a:pPr>
-            <a:r>
-              <a:rPr lang="en-US" sz="2200" dirty="0"/>
-              <a:t>Academics Balked and Public / Private Key Encryption soon Emerged.</a:t>
-            </a:r>
+            <a:endParaRPr lang="en-US" sz="3000" dirty="0"/>
           </a:p>
           <a:p>
             <a:pPr marL="342900" indent="-342900">
@@ -6334,24 +6475,22 @@
               <a:buChar char="•"/>
             </a:pPr>
             <a:r>
-              <a:rPr lang="en-US" sz="2200" dirty="0"/>
-              <a:t>“</a:t>
-            </a:r>
-            <a:r>
-              <a:rPr lang="en-US" sz="2200" dirty="0" err="1"/>
+              <a:rPr lang="en-US" sz="3000" dirty="0"/>
+              <a:t>Blockchain arose from research and communication of “</a:t>
+            </a:r>
+            <a:r>
+              <a:rPr lang="en-US" sz="3000" dirty="0" err="1"/>
               <a:t>Cypherpunks</a:t>
             </a:r>
             <a:r>
-              <a:rPr lang="en-US" sz="2200" dirty="0"/>
-              <a:t>”, a technical community focused on privacy and rebellion against controlling authorities.</a:t>
-            </a:r>
-            <a:endParaRPr lang="en-US" sz="2200" dirty="0">
-              <a:solidFill>
-                <a:schemeClr val="bg1">
-                  <a:lumMod val="50000"/>
-                </a:schemeClr>
-              </a:solidFill>
-            </a:endParaRPr>
+              <a:rPr lang="en-US" sz="3000" dirty="0"/>
+              <a:t>”, a rebellious technical community.</a:t>
+            </a:r>
+            <a:r>
+              <a:rPr lang="en-US" sz="3000" baseline="30000" dirty="0"/>
+              <a:t> [3]</a:t>
+            </a:r>
+            <a:endParaRPr lang="en-US" sz="3000" dirty="0"/>
           </a:p>
           <a:p>
             <a:pPr marL="342900" indent="-342900">
@@ -6361,48 +6500,7 @@
               <a:buFont typeface="Arial" panose="020B0604020202020204" pitchFamily="34" charset="0"/>
               <a:buChar char="•"/>
             </a:pPr>
-            <a:r>
-              <a:rPr lang="en-US" sz="2200" dirty="0">
-                <a:solidFill>
-                  <a:schemeClr val="bg1">
-                    <a:lumMod val="50000"/>
-                  </a:schemeClr>
-                </a:solidFill>
-              </a:rPr>
-              <a:t>Blockchain arose from research and communication in this group.</a:t>
-            </a:r>
-          </a:p>
-          <a:p>
-            <a:pPr marL="342900" indent="-342900">
-              <a:lnSpc>
-                <a:spcPct val="150000"/>
-              </a:lnSpc>
-              <a:buFont typeface="Arial" panose="020B0604020202020204" pitchFamily="34" charset="0"/>
-              <a:buChar char="•"/>
-            </a:pPr>
-            <a:r>
-              <a:rPr lang="en-US" sz="2200" dirty="0"/>
-              <a:t>The technology for Blockchain was based on the concept of “Blind Signatures” by David </a:t>
-            </a:r>
-            <a:r>
-              <a:rPr lang="en-US" sz="2200" dirty="0" err="1"/>
-              <a:t>Chaum</a:t>
-            </a:r>
-            <a:r>
-              <a:rPr lang="en-US" sz="2200" dirty="0"/>
-              <a:t>, which provided accountability without compromising privacy but still relied on a third-party approver., such as a bank .</a:t>
-            </a:r>
-            <a:r>
-              <a:rPr lang="en-US" sz="2200" baseline="30000" dirty="0">
-                <a:solidFill>
-                  <a:schemeClr val="bg1">
-                    <a:lumMod val="50000"/>
-                  </a:schemeClr>
-                </a:solidFill>
-              </a:rPr>
-              <a:t> [3]</a:t>
-            </a:r>
-            <a:endParaRPr lang="en-US" sz="2200" dirty="0"/>
+            <a:endParaRPr lang="en-US" sz="3000" dirty="0"/>
           </a:p>
           <a:p>
             <a:pPr marL="285750" indent="-285750">
@@ -6412,37 +6510,15 @@
               <a:buFont typeface="Arial" panose="020B0604020202020204" pitchFamily="34" charset="0"/>
               <a:buChar char="•"/>
             </a:pPr>
-            <a:endParaRPr lang="en-US" sz="2200" dirty="0"/>
-          </a:p>
-          <a:p>
-            <a:pPr marL="285750" indent="-285750">
-              <a:lnSpc>
-                <a:spcPct val="150000"/>
-              </a:lnSpc>
-              <a:buFont typeface="Arial" panose="020B0604020202020204" pitchFamily="34" charset="0"/>
-              <a:buChar char="•"/>
-            </a:pPr>
-            <a:r>
-              <a:rPr lang="en-US" sz="2200" dirty="0"/>
-              <a:t>Blockchain also borrowed concepts from Hal Finney’s “Reusable Proofs of Work (RPOW)”, which required systems slow themselves down in order to increase the cost of an attack.</a:t>
-            </a:r>
-            <a:r>
-              <a:rPr lang="en-US" sz="2200" baseline="30000" dirty="0">
-                <a:solidFill>
-                  <a:schemeClr val="bg1">
-                    <a:lumMod val="50000"/>
-                  </a:schemeClr>
-                </a:solidFill>
-              </a:rPr>
-              <a:t> [4]Encryption Sta</a:t>
-            </a:r>
-            <a:endParaRPr lang="en-US" sz="2200" dirty="0">
-              <a:solidFill>
-                <a:schemeClr val="bg1">
-                  <a:lumMod val="50000"/>
-                </a:schemeClr>
-              </a:solidFill>
-            </a:endParaRPr>
+            <a:r>
+              <a:rPr lang="en-US" sz="3000" dirty="0"/>
+              <a:t>Also borrowed from Hal Finney’s “Reusable Proofs of Work”, which require slow systems in order to increase the cost of an attack.</a:t>
+            </a:r>
+            <a:r>
+              <a:rPr lang="en-US" sz="3000" baseline="30000" dirty="0"/>
+              <a:t> [4]</a:t>
+            </a:r>
+            <a:endParaRPr lang="en-US" sz="3000" dirty="0"/>
           </a:p>
         </p:txBody>
       </p:sp>
@@ -6478,27 +6554,250 @@
       </p:grpSpPr>
       <p:sp>
         <p:nvSpPr>
-          <p:cNvPr id="2" name="Rectangle 1">
-            <a:extLst>
-              <a:ext uri="{FF2B5EF4-FFF2-40B4-BE49-F238E27FC236}">
-                <a16:creationId xmlns:a16="http://schemas.microsoft.com/office/drawing/2014/main" id="{65F4864F-F26F-4443-93C5-EC1F588B0CEF}"/>
-              </a:ext>
-            </a:extLst>
-          </p:cNvPr>
-          <p:cNvSpPr/>
+          <p:cNvPr id="4" name="Title 3" hidden="1">
+            <a:extLst>
+              <a:ext uri="{FF2B5EF4-FFF2-40B4-BE49-F238E27FC236}">
+                <a16:creationId xmlns:a16="http://schemas.microsoft.com/office/drawing/2014/main" id="{B5981CF1-BC08-49F8-B0F9-AAF98EC67450}"/>
+              </a:ext>
+            </a:extLst>
+          </p:cNvPr>
+          <p:cNvSpPr>
+            <a:spLocks noGrp="1"/>
+          </p:cNvSpPr>
+          <p:nvPr>
+            <p:ph type="title" idx="4294967295"/>
+          </p:nvPr>
+        </p:nvSpPr>
+        <p:spPr>
+          <a:xfrm>
+            <a:off x="0" y="365125"/>
+            <a:ext cx="10515600" cy="1325563"/>
+          </a:xfrm>
+        </p:spPr>
+        <p:txBody>
+          <a:bodyPr/>
+          <a:lstStyle/>
+          <a:p>
+            <a:r>
+              <a:rPr lang="en-US" dirty="0"/>
+              <a:t>Project analysis slide 2</a:t>
+            </a:r>
+          </a:p>
+        </p:txBody>
+      </p:sp>
+      <p:cxnSp>
+        <p:nvCxnSpPr>
+          <p:cNvPr id="8" name="Straight Connector 7">
+            <a:extLst>
+              <a:ext uri="{FF2B5EF4-FFF2-40B4-BE49-F238E27FC236}">
+                <a16:creationId xmlns:a16="http://schemas.microsoft.com/office/drawing/2014/main" id="{D0986099-F5F2-4E8B-BE17-81194861A00C}"/>
+              </a:ext>
+              <a:ext uri="{C183D7F6-B498-43B3-948B-1728B52AA6E4}">
+                <adec:decorative xmlns:adec="http://schemas.microsoft.com/office/drawing/2017/decorative" val="1"/>
+              </a:ext>
+            </a:extLst>
+          </p:cNvPr>
+          <p:cNvCxnSpPr>
+            <a:cxnSpLocks/>
+          </p:cNvCxnSpPr>
           <p:nvPr/>
-        </p:nvSpPr>
-        <p:spPr>
-          <a:xfrm>
-            <a:off x="988943" y="309588"/>
-            <a:ext cx="10033553" cy="5546327"/>
+        </p:nvCxnSpPr>
+        <p:spPr>
+          <a:xfrm>
+            <a:off x="9545053" y="522898"/>
+            <a:ext cx="2646947" cy="0"/>
+          </a:xfrm>
+          <a:prstGeom prst="line">
+            <a:avLst/>
+          </a:prstGeom>
+          <a:ln>
+            <a:solidFill>
+              <a:schemeClr val="accent3">
+                <a:lumMod val="50000"/>
+              </a:schemeClr>
+            </a:solidFill>
+            <a:headEnd type="oval"/>
+          </a:ln>
+        </p:spPr>
+        <p:style>
+          <a:lnRef idx="1">
+            <a:schemeClr val="accent1"/>
+          </a:lnRef>
+          <a:fillRef idx="0">
+            <a:schemeClr val="accent1"/>
+          </a:fillRef>
+          <a:effectRef idx="0">
+            <a:schemeClr val="accent1"/>
+          </a:effectRef>
+          <a:fontRef idx="minor">
+            <a:schemeClr val="tx1"/>
+          </a:fontRef>
+        </p:style>
+      </p:cxnSp>
+      <p:sp>
+        <p:nvSpPr>
+          <p:cNvPr id="11" name="Title 1">
+            <a:extLst>
+              <a:ext uri="{FF2B5EF4-FFF2-40B4-BE49-F238E27FC236}">
+                <a16:creationId xmlns:a16="http://schemas.microsoft.com/office/drawing/2014/main" id="{4E3F5479-058B-4FA8-92E9-18CAB8CDC5C5}"/>
+              </a:ext>
+            </a:extLst>
+          </p:cNvPr>
+          <p:cNvSpPr txBox="1">
+            <a:spLocks/>
+          </p:cNvSpPr>
+          <p:nvPr/>
+        </p:nvSpPr>
+        <p:spPr>
+          <a:xfrm>
+            <a:off x="228600" y="-31099"/>
+            <a:ext cx="11734800" cy="1218795"/>
           </a:xfrm>
           <a:prstGeom prst="rect">
             <a:avLst/>
           </a:prstGeom>
         </p:spPr>
         <p:txBody>
-          <a:bodyPr wrap="square">
+          <a:bodyPr vert="horz" wrap="square" lIns="0" tIns="0" rIns="0" bIns="0" rtlCol="0" anchor="ctr">
+            <a:spAutoFit/>
+          </a:bodyPr>
+          <a:lstStyle>
+            <a:lvl1pPr algn="l" defTabSz="914400" rtl="0" eaLnBrk="1" latinLnBrk="0" hangingPunct="1">
+              <a:lnSpc>
+                <a:spcPct val="90000"/>
+              </a:lnSpc>
+              <a:spcBef>
+                <a:spcPct val="0"/>
+              </a:spcBef>
+              <a:buNone/>
+              <a:defRPr sz="4400" kern="1200">
+                <a:solidFill>
+                  <a:schemeClr val="tx1"/>
+                </a:solidFill>
+                <a:latin typeface="+mj-lt"/>
+                <a:ea typeface="+mj-ea"/>
+                <a:cs typeface="+mj-cs"/>
+              </a:defRPr>
+            </a:lvl1pPr>
+          </a:lstStyle>
+          <a:p>
+            <a:pPr algn="ctr"/>
+            <a:endParaRPr lang="en-US" sz="2800" b="1" dirty="0">
+              <a:solidFill>
+                <a:schemeClr val="tx1">
+                  <a:lumMod val="75000"/>
+                  <a:lumOff val="25000"/>
+                </a:schemeClr>
+              </a:solidFill>
+            </a:endParaRPr>
+          </a:p>
+          <a:p>
+            <a:pPr algn="ctr"/>
+            <a:r>
+              <a:rPr lang="en-US" sz="3000" b="1" dirty="0">
+                <a:solidFill>
+                  <a:schemeClr val="tx1">
+                    <a:lumMod val="75000"/>
+                    <a:lumOff val="25000"/>
+                  </a:schemeClr>
+                </a:solidFill>
+              </a:rPr>
+              <a:t>The Birth of Blockchain</a:t>
+            </a:r>
+            <a:br>
+              <a:rPr lang="en-US" sz="3000" dirty="0">
+                <a:solidFill>
+                  <a:schemeClr val="tx1">
+                    <a:lumMod val="75000"/>
+                    <a:lumOff val="25000"/>
+                  </a:schemeClr>
+                </a:solidFill>
+              </a:rPr>
+            </a:br>
+            <a:endParaRPr lang="en-US" sz="3000" dirty="0">
+              <a:solidFill>
+                <a:schemeClr val="tx1">
+                  <a:lumMod val="75000"/>
+                  <a:lumOff val="25000"/>
+                </a:schemeClr>
+              </a:solidFill>
+            </a:endParaRPr>
+          </a:p>
+        </p:txBody>
+      </p:sp>
+      <p:cxnSp>
+        <p:nvCxnSpPr>
+          <p:cNvPr id="14" name="Straight Connector 13">
+            <a:extLst>
+              <a:ext uri="{FF2B5EF4-FFF2-40B4-BE49-F238E27FC236}">
+                <a16:creationId xmlns:a16="http://schemas.microsoft.com/office/drawing/2014/main" id="{83E690F4-843A-47A5-8620-4FB01C0D8E68}"/>
+              </a:ext>
+              <a:ext uri="{C183D7F6-B498-43B3-948B-1728B52AA6E4}">
+                <adec:decorative xmlns:adec="http://schemas.microsoft.com/office/drawing/2017/decorative" val="1"/>
+              </a:ext>
+            </a:extLst>
+          </p:cNvPr>
+          <p:cNvCxnSpPr>
+            <a:cxnSpLocks/>
+          </p:cNvCxnSpPr>
+          <p:nvPr/>
+        </p:nvCxnSpPr>
+        <p:spPr>
+          <a:xfrm>
+            <a:off x="0" y="522898"/>
+            <a:ext cx="2582779" cy="0"/>
+          </a:xfrm>
+          <a:prstGeom prst="line">
+            <a:avLst/>
+          </a:prstGeom>
+          <a:ln>
+            <a:solidFill>
+              <a:schemeClr val="accent3">
+                <a:lumMod val="50000"/>
+              </a:schemeClr>
+            </a:solidFill>
+            <a:tailEnd type="oval"/>
+          </a:ln>
+        </p:spPr>
+        <p:style>
+          <a:lnRef idx="1">
+            <a:schemeClr val="accent1"/>
+          </a:lnRef>
+          <a:fillRef idx="0">
+            <a:schemeClr val="accent1"/>
+          </a:fillRef>
+          <a:effectRef idx="0">
+            <a:schemeClr val="accent1"/>
+          </a:effectRef>
+          <a:fontRef idx="minor">
+            <a:schemeClr val="tx1"/>
+          </a:fontRef>
+        </p:style>
+      </p:cxnSp>
+      <p:sp>
+        <p:nvSpPr>
+          <p:cNvPr id="2" name="TextBox 1">
+            <a:extLst>
+              <a:ext uri="{FF2B5EF4-FFF2-40B4-BE49-F238E27FC236}">
+                <a16:creationId xmlns:a16="http://schemas.microsoft.com/office/drawing/2014/main" id="{F4DDFAF4-F163-4D9E-BFE4-F1061060BEE8}"/>
+              </a:ext>
+            </a:extLst>
+          </p:cNvPr>
+          <p:cNvSpPr txBox="1"/>
+          <p:nvPr/>
+        </p:nvSpPr>
+        <p:spPr>
+          <a:xfrm>
+            <a:off x="228600" y="757473"/>
+            <a:ext cx="11364985" cy="5546327"/>
+          </a:xfrm>
+          <a:prstGeom prst="rect">
+            <a:avLst/>
+          </a:prstGeom>
+          <a:noFill/>
+        </p:spPr>
+        <p:txBody>
+          <a:bodyPr wrap="square" rtlCol="0">
             <a:spAutoFit/>
           </a:bodyPr>
           <a:lstStyle/>
@@ -6511,48 +6810,22 @@
               <a:buChar char="•"/>
             </a:pPr>
             <a:r>
-              <a:rPr lang="en-US" sz="3000"/>
-              <a:t>Blockchain </a:t>
-            </a:r>
-            <a:r>
               <a:rPr lang="en-US" sz="3000" dirty="0"/>
-              <a:t>was based on the concept of “Blind Signatures” by David </a:t>
-            </a:r>
-            <a:r>
-              <a:rPr lang="en-US" sz="3000" dirty="0" err="1"/>
-              <a:t>Chaum</a:t>
-            </a:r>
-            <a:r>
-              <a:rPr lang="en-US" sz="3000" dirty="0"/>
-              <a:t>, </a:t>
-            </a:r>
-          </a:p>
-          <a:p>
-            <a:pPr marL="800100" lvl="1" indent="-342900">
+              <a:t>DES only used easily-cracked 56-bit encryption keys, building mistrust in traditional encryption algorithms.</a:t>
+            </a:r>
+          </a:p>
+          <a:p>
+            <a:pPr marL="342900" indent="-342900">
               <a:lnSpc>
                 <a:spcPct val="150000"/>
               </a:lnSpc>
               <a:buFont typeface="Arial" panose="020B0604020202020204" pitchFamily="34" charset="0"/>
               <a:buChar char="•"/>
             </a:pPr>
-            <a:r>
-              <a:rPr lang="en-US" sz="3000" dirty="0"/>
-              <a:t>Provided accountability but relied on a third-party approver., such as a bank .</a:t>
-            </a:r>
-            <a:r>
-              <a:rPr lang="en-US" sz="3000" baseline="30000" dirty="0">
-                <a:solidFill>
-                  <a:schemeClr val="bg1">
-                    <a:lumMod val="50000"/>
-                  </a:schemeClr>
-                </a:solidFill>
-              </a:rPr>
-              <a:t> [3]</a:t>
-            </a:r>
             <a:endParaRPr lang="en-US" sz="3000" dirty="0"/>
           </a:p>
           <a:p>
-            <a:pPr marL="285750" indent="-285750">
+            <a:pPr marL="342900" indent="-342900">
               <a:lnSpc>
                 <a:spcPct val="150000"/>
               </a:lnSpc>
@@ -6561,11 +6834,27 @@
             </a:pPr>
             <a:r>
               <a:rPr lang="en-US" sz="3000" dirty="0"/>
-              <a:t>Blockchain also borrowed concepts from Hal Finney’s “Reusable Proofs of Work (RPOW)”, </a:t>
-            </a:r>
-          </a:p>
-          <a:p>
-            <a:pPr marL="742950" lvl="1" indent="-285750">
+              <a:t>Using the tenants of the </a:t>
+            </a:r>
+            <a:r>
+              <a:rPr lang="en-US" sz="3000" dirty="0" err="1"/>
+              <a:t>Cypherpunks</a:t>
+            </a:r>
+            <a:r>
+              <a:rPr lang="en-US" sz="3000" dirty="0"/>
+              <a:t> and the technology around Blind Signatures and RPOW, Blockchain was born.</a:t>
+            </a:r>
+          </a:p>
+          <a:p>
+            <a:pPr>
+              <a:lnSpc>
+                <a:spcPct val="150000"/>
+              </a:lnSpc>
+            </a:pPr>
+            <a:endParaRPr lang="en-US" sz="3000" dirty="0"/>
+          </a:p>
+          <a:p>
+            <a:pPr marL="342900" indent="-342900">
               <a:lnSpc>
                 <a:spcPct val="150000"/>
               </a:lnSpc>
@@ -6574,32 +6863,49 @@
             </a:pPr>
             <a:r>
               <a:rPr lang="en-US" sz="3000" dirty="0"/>
-              <a:t>Required systems slow themselves down to increase cost of an attack.</a:t>
-            </a:r>
-            <a:r>
-              <a:rPr lang="en-US" sz="3000" baseline="30000" dirty="0">
-                <a:solidFill>
-                  <a:schemeClr val="bg1">
-                    <a:lumMod val="50000"/>
-                  </a:schemeClr>
-                </a:solidFill>
-              </a:rPr>
-              <a:t> [4]Encryption Sta</a:t>
-            </a:r>
-            <a:endParaRPr lang="en-US" sz="3000" dirty="0">
-              <a:solidFill>
-                <a:schemeClr val="bg1">
-                  <a:lumMod val="50000"/>
-                </a:schemeClr>
-              </a:solidFill>
-            </a:endParaRPr>
+              <a:t>Bitcoin was the first cryptocurrency to establish trust and accountability without a central authority</a:t>
+            </a:r>
+          </a:p>
+        </p:txBody>
+      </p:sp>
+      <p:sp>
+        <p:nvSpPr>
+          <p:cNvPr id="6" name="Footer Placeholder 5">
+            <a:extLst>
+              <a:ext uri="{FF2B5EF4-FFF2-40B4-BE49-F238E27FC236}">
+                <a16:creationId xmlns:a16="http://schemas.microsoft.com/office/drawing/2014/main" id="{EFAD71D7-C7AE-436E-BB39-4D9D83781C82}"/>
+              </a:ext>
+            </a:extLst>
+          </p:cNvPr>
+          <p:cNvSpPr>
+            <a:spLocks noGrp="1"/>
+          </p:cNvSpPr>
+          <p:nvPr>
+            <p:ph type="ftr" sz="quarter" idx="11"/>
+          </p:nvPr>
+        </p:nvSpPr>
+        <p:spPr>
+          <a:xfrm>
+            <a:off x="228600" y="6356350"/>
+            <a:ext cx="7924800" cy="501650"/>
+          </a:xfrm>
+        </p:spPr>
+        <p:txBody>
+          <a:bodyPr/>
+          <a:lstStyle/>
+          <a:p>
+            <a:pPr algn="l"/>
+            <a:r>
+              <a:rPr lang="en-US" sz="1400" dirty="0"/>
+              <a:t>See reference [1]</a:t>
+            </a:r>
           </a:p>
         </p:txBody>
       </p:sp>
     </p:spTree>
     <p:extLst>
       <p:ext uri="{BB962C8B-B14F-4D97-AF65-F5344CB8AC3E}">
-        <p14:creationId xmlns:p14="http://schemas.microsoft.com/office/powerpoint/2010/main" val="1625856100"/>
+        <p14:creationId xmlns:p14="http://schemas.microsoft.com/office/powerpoint/2010/main" val="197546627"/>
       </p:ext>
     </p:extLst>
   </p:cSld>
@@ -6724,8 +7030,8 @@
         </p:nvSpPr>
         <p:spPr>
           <a:xfrm>
-            <a:off x="228600" y="-3399"/>
-            <a:ext cx="11734800" cy="1163395"/>
+            <a:off x="228600" y="-31099"/>
+            <a:ext cx="11734800" cy="1218795"/>
           </a:xfrm>
           <a:prstGeom prst="rect">
             <a:avLst/>
@@ -6768,7 +7074,7 @@
           <a:p>
             <a:pPr algn="ctr"/>
             <a:r>
-              <a:rPr lang="en-US" sz="2800" b="1" dirty="0">
+              <a:rPr lang="en-US" sz="3000" b="1" dirty="0">
                 <a:solidFill>
                   <a:schemeClr val="tx1">
                     <a:lumMod val="75000"/>
@@ -6776,10 +7082,10 @@
                   </a:schemeClr>
                 </a:solidFill>
               </a:rPr>
-              <a:t>The Birth of Blockchain</a:t>
+              <a:t>Blockchain Walkthrough Pt 1</a:t>
             </a:r>
             <a:br>
-              <a:rPr lang="en-US" sz="2800" dirty="0">
+              <a:rPr lang="en-US" sz="3000" dirty="0">
                 <a:solidFill>
                   <a:schemeClr val="tx1">
                     <a:lumMod val="75000"/>
@@ -6788,7 +7094,7 @@
                 </a:solidFill>
               </a:rPr>
             </a:br>
-            <a:endParaRPr lang="en-US" sz="2800" dirty="0">
+            <a:endParaRPr lang="en-US" sz="3000" dirty="0">
               <a:solidFill>
                 <a:schemeClr val="tx1">
                   <a:lumMod val="75000"/>
@@ -6850,10 +7156,10 @@
       </p:cxnSp>
       <p:sp>
         <p:nvSpPr>
-          <p:cNvPr id="2" name="TextBox 1">
-            <a:extLst>
-              <a:ext uri="{FF2B5EF4-FFF2-40B4-BE49-F238E27FC236}">
-                <a16:creationId xmlns:a16="http://schemas.microsoft.com/office/drawing/2014/main" id="{F4DDFAF4-F163-4D9E-BFE4-F1061060BEE8}"/>
+          <p:cNvPr id="7" name="TextBox 6">
+            <a:extLst>
+              <a:ext uri="{FF2B5EF4-FFF2-40B4-BE49-F238E27FC236}">
+                <a16:creationId xmlns:a16="http://schemas.microsoft.com/office/drawing/2014/main" id="{EA6205B6-A1DB-4CBF-A06D-3428120DB0ED}"/>
               </a:ext>
             </a:extLst>
           </p:cNvPr>
@@ -6862,8 +7168,8 @@
         </p:nvSpPr>
         <p:spPr>
           <a:xfrm>
-            <a:off x="228600" y="950482"/>
-            <a:ext cx="11364985" cy="5615383"/>
+            <a:off x="633663" y="1098198"/>
+            <a:ext cx="10924674" cy="1938992"/>
           </a:xfrm>
           <a:prstGeom prst="rect">
             <a:avLst/>
@@ -6876,80 +7182,94 @@
           </a:bodyPr>
           <a:lstStyle/>
           <a:p>
-            <a:pPr marL="342900" indent="-342900">
-              <a:lnSpc>
-                <a:spcPct val="150000"/>
-              </a:lnSpc>
-              <a:buFont typeface="Arial" panose="020B0604020202020204" pitchFamily="34" charset="0"/>
-              <a:buChar char="•"/>
+            <a:pPr marL="514350" indent="-514350">
+              <a:buFont typeface="+mj-lt"/>
+              <a:buAutoNum type="arabicPeriod"/>
             </a:pPr>
             <a:r>
-              <a:rPr lang="en-US" sz="2200" dirty="0"/>
-              <a:t>Using the tenants of the </a:t>
-            </a:r>
-            <a:r>
-              <a:rPr lang="en-US" sz="2200" dirty="0" err="1"/>
-              <a:t>Cypherpunks</a:t>
-            </a:r>
-            <a:r>
-              <a:rPr lang="en-US" sz="2200" dirty="0"/>
-              <a:t> and the technology around Blind Signatures and RPOW, along with a general mistrust of central authorities approving transactions, Blockchain was born.</a:t>
-            </a:r>
-          </a:p>
-          <a:p>
-            <a:pPr marL="342900" indent="-342900">
-              <a:lnSpc>
-                <a:spcPct val="150000"/>
-              </a:lnSpc>
-              <a:buFont typeface="Arial" panose="020B0604020202020204" pitchFamily="34" charset="0"/>
-              <a:buChar char="•"/>
+              <a:rPr lang="en-US" sz="3000" dirty="0"/>
+              <a:t>A Blockchain transaction is created and asymmetrically encrypted</a:t>
+            </a:r>
+          </a:p>
+          <a:p>
+            <a:pPr marL="514350" indent="-514350">
+              <a:buFont typeface="+mj-lt"/>
+              <a:buAutoNum type="arabicPeriod"/>
             </a:pPr>
-            <a:endParaRPr lang="en-US" sz="2200" dirty="0"/>
-          </a:p>
-          <a:p>
-            <a:pPr marL="342900" indent="-342900">
-              <a:lnSpc>
-                <a:spcPct val="150000"/>
-              </a:lnSpc>
-              <a:buFont typeface="Arial" panose="020B0604020202020204" pitchFamily="34" charset="0"/>
-              <a:buChar char="•"/>
+            <a:endParaRPr lang="en-US" sz="3000" dirty="0"/>
+          </a:p>
+          <a:p>
+            <a:pPr marL="514350" indent="-514350">
+              <a:buFont typeface="+mj-lt"/>
+              <a:buAutoNum type="arabicPeriod"/>
             </a:pPr>
             <a:r>
-              <a:rPr lang="en-US" sz="2200" dirty="0"/>
-              <a:t>The originally proposal for Blockchain was in a 2008 paper by Satoshi Nakamoto and was intended for a cryptocurrency called Bitcoin, but generically could be used for any digital transaction.</a:t>
-            </a:r>
-          </a:p>
-          <a:p>
-            <a:pPr marL="342900" indent="-342900">
-              <a:lnSpc>
-                <a:spcPct val="150000"/>
-              </a:lnSpc>
-              <a:buFont typeface="Arial" panose="020B0604020202020204" pitchFamily="34" charset="0"/>
-              <a:buChar char="•"/>
-            </a:pPr>
-            <a:endParaRPr lang="en-US" sz="2200" dirty="0"/>
-          </a:p>
-          <a:p>
-            <a:pPr marL="342900" indent="-342900">
-              <a:lnSpc>
-                <a:spcPct val="150000"/>
-              </a:lnSpc>
-              <a:buFont typeface="Arial" panose="020B0604020202020204" pitchFamily="34" charset="0"/>
-              <a:buChar char="•"/>
-            </a:pPr>
-            <a:r>
-              <a:rPr lang="en-US" sz="2200" dirty="0"/>
-              <a:t>Bitcoin was not the first cryptocurrency, but it was the first cryptocurrency to establish trust and accountability without a central authority, making Blockchain a huge leap forward in cyber security.</a:t>
-            </a:r>
-          </a:p>
-        </p:txBody>
-      </p:sp>
-      <p:sp>
-        <p:nvSpPr>
-          <p:cNvPr id="6" name="Footer Placeholder 5">
-            <a:extLst>
-              <a:ext uri="{FF2B5EF4-FFF2-40B4-BE49-F238E27FC236}">
-                <a16:creationId xmlns:a16="http://schemas.microsoft.com/office/drawing/2014/main" id="{EFAD71D7-C7AE-436E-BB39-4D9D83781C82}"/>
+              <a:rPr lang="en-US" sz="3000" dirty="0"/>
+              <a:t>The transaction is added to a transaction pool for validation</a:t>
+            </a:r>
+          </a:p>
+        </p:txBody>
+      </p:sp>
+      <p:sp>
+        <p:nvSpPr>
+          <p:cNvPr id="10" name="Arrow: Down 9">
+            <a:extLst>
+              <a:ext uri="{FF2B5EF4-FFF2-40B4-BE49-F238E27FC236}">
+                <a16:creationId xmlns:a16="http://schemas.microsoft.com/office/drawing/2014/main" id="{115C9850-AD4B-4E4A-8DCF-1E4A8F68A888}"/>
+              </a:ext>
+            </a:extLst>
+          </p:cNvPr>
+          <p:cNvSpPr/>
+          <p:nvPr/>
+        </p:nvSpPr>
+        <p:spPr>
+          <a:xfrm rot="16200000">
+            <a:off x="9145592" y="4179855"/>
+            <a:ext cx="770021" cy="784534"/>
+          </a:xfrm>
+          <a:prstGeom prst="downArrow">
+            <a:avLst/>
+          </a:prstGeom>
+          <a:solidFill>
+            <a:schemeClr val="tx1"/>
+          </a:solidFill>
+          <a:ln>
+            <a:solidFill>
+              <a:schemeClr val="tx1"/>
+            </a:solidFill>
+          </a:ln>
+        </p:spPr>
+        <p:style>
+          <a:lnRef idx="2">
+            <a:schemeClr val="accent1">
+              <a:shade val="50000"/>
+            </a:schemeClr>
+          </a:lnRef>
+          <a:fillRef idx="1">
+            <a:schemeClr val="accent1"/>
+          </a:fillRef>
+          <a:effectRef idx="0">
+            <a:schemeClr val="accent1"/>
+          </a:effectRef>
+          <a:fontRef idx="minor">
+            <a:schemeClr val="lt1"/>
+          </a:fontRef>
+        </p:style>
+        <p:txBody>
+          <a:bodyPr rtlCol="0" anchor="ctr"/>
+          <a:lstStyle/>
+          <a:p>
+            <a:pPr algn="ctr"/>
+            <a:endParaRPr lang="en-US"/>
+          </a:p>
+        </p:txBody>
+      </p:sp>
+      <p:sp>
+        <p:nvSpPr>
+          <p:cNvPr id="13" name="Footer Placeholder 5">
+            <a:extLst>
+              <a:ext uri="{FF2B5EF4-FFF2-40B4-BE49-F238E27FC236}">
+                <a16:creationId xmlns:a16="http://schemas.microsoft.com/office/drawing/2014/main" id="{6601C29C-C5E1-4C22-996A-4F6B68D2584F}"/>
               </a:ext>
             </a:extLst>
           </p:cNvPr>
@@ -6978,10 +7298,94 @@
           </a:p>
         </p:txBody>
       </p:sp>
+      <p:pic>
+        <p:nvPicPr>
+          <p:cNvPr id="5" name="Picture 4">
+            <a:extLst>
+              <a:ext uri="{FF2B5EF4-FFF2-40B4-BE49-F238E27FC236}">
+                <a16:creationId xmlns:a16="http://schemas.microsoft.com/office/drawing/2014/main" id="{875434C7-83A4-4B33-934C-D64A2DA0EFF3}"/>
+              </a:ext>
+            </a:extLst>
+          </p:cNvPr>
+          <p:cNvPicPr>
+            <a:picLocks noChangeAspect="1"/>
+          </p:cNvPicPr>
+          <p:nvPr/>
+        </p:nvPicPr>
+        <p:blipFill>
+          <a:blip r:embed="rId2"/>
+          <a:stretch>
+            <a:fillRect/>
+          </a:stretch>
+        </p:blipFill>
+        <p:spPr>
+          <a:xfrm>
+            <a:off x="1628740" y="2906656"/>
+            <a:ext cx="7353300" cy="3200400"/>
+          </a:xfrm>
+          <a:prstGeom prst="rect">
+            <a:avLst/>
+          </a:prstGeom>
+        </p:spPr>
+      </p:pic>
+      <p:sp>
+        <p:nvSpPr>
+          <p:cNvPr id="16" name="Arrow: Down 15">
+            <a:extLst>
+              <a:ext uri="{FF2B5EF4-FFF2-40B4-BE49-F238E27FC236}">
+                <a16:creationId xmlns:a16="http://schemas.microsoft.com/office/drawing/2014/main" id="{8BF25AEE-6A30-4BCE-ACEA-0BFD0B62F952}"/>
+              </a:ext>
+            </a:extLst>
+          </p:cNvPr>
+          <p:cNvSpPr/>
+          <p:nvPr/>
+        </p:nvSpPr>
+        <p:spPr>
+          <a:xfrm rot="16200000">
+            <a:off x="4708612" y="4179855"/>
+            <a:ext cx="770021" cy="784534"/>
+          </a:xfrm>
+          <a:prstGeom prst="downArrow">
+            <a:avLst/>
+          </a:prstGeom>
+          <a:solidFill>
+            <a:schemeClr val="tx1"/>
+          </a:solidFill>
+          <a:ln>
+            <a:solidFill>
+              <a:schemeClr val="tx1"/>
+            </a:solidFill>
+          </a:ln>
+        </p:spPr>
+        <p:style>
+          <a:lnRef idx="2">
+            <a:schemeClr val="accent1">
+              <a:shade val="50000"/>
+            </a:schemeClr>
+          </a:lnRef>
+          <a:fillRef idx="1">
+            <a:schemeClr val="accent1"/>
+          </a:fillRef>
+          <a:effectRef idx="0">
+            <a:schemeClr val="accent1"/>
+          </a:effectRef>
+          <a:fontRef idx="minor">
+            <a:schemeClr val="lt1"/>
+          </a:fontRef>
+        </p:style>
+        <p:txBody>
+          <a:bodyPr rtlCol="0" anchor="ctr"/>
+          <a:lstStyle/>
+          <a:p>
+            <a:pPr algn="ctr"/>
+            <a:endParaRPr lang="en-US"/>
+          </a:p>
+        </p:txBody>
+      </p:sp>
     </p:spTree>
     <p:extLst>
       <p:ext uri="{BB962C8B-B14F-4D97-AF65-F5344CB8AC3E}">
-        <p14:creationId xmlns:p14="http://schemas.microsoft.com/office/powerpoint/2010/main" val="197546627"/>
+        <p14:creationId xmlns:p14="http://schemas.microsoft.com/office/powerpoint/2010/main" val="3912653021"/>
       </p:ext>
     </p:extLst>
   </p:cSld>
@@ -7106,8 +7510,8 @@
         </p:nvSpPr>
         <p:spPr>
           <a:xfrm>
-            <a:off x="228600" y="-3399"/>
-            <a:ext cx="11734800" cy="1163395"/>
+            <a:off x="228600" y="-31099"/>
+            <a:ext cx="11734800" cy="1218795"/>
           </a:xfrm>
           <a:prstGeom prst="rect">
             <a:avLst/>
@@ -7150,7 +7554,7 @@
           <a:p>
             <a:pPr algn="ctr"/>
             <a:r>
-              <a:rPr lang="en-US" sz="2800" b="1" dirty="0">
+              <a:rPr lang="en-US" sz="3000" b="1" dirty="0">
                 <a:solidFill>
                   <a:schemeClr val="tx1">
                     <a:lumMod val="75000"/>
@@ -7158,10 +7562,10 @@
                   </a:schemeClr>
                 </a:solidFill>
               </a:rPr>
-              <a:t>Blockchain Walkthrough Pt 1</a:t>
+              <a:t>Blockchain Walkthrough Pt 2</a:t>
             </a:r>
             <a:br>
-              <a:rPr lang="en-US" sz="2800" dirty="0">
+              <a:rPr lang="en-US" sz="3000" dirty="0">
                 <a:solidFill>
                   <a:schemeClr val="tx1">
                     <a:lumMod val="75000"/>
@@ -7170,7 +7574,7 @@
                 </a:solidFill>
               </a:rPr>
             </a:br>
-            <a:endParaRPr lang="en-US" sz="2800" dirty="0">
+            <a:endParaRPr lang="en-US" sz="3000" dirty="0">
               <a:solidFill>
                 <a:schemeClr val="tx1">
                   <a:lumMod val="75000"/>
@@ -7232,10 +7636,10 @@
       </p:cxnSp>
       <p:sp>
         <p:nvSpPr>
-          <p:cNvPr id="7" name="TextBox 6">
-            <a:extLst>
-              <a:ext uri="{FF2B5EF4-FFF2-40B4-BE49-F238E27FC236}">
-                <a16:creationId xmlns:a16="http://schemas.microsoft.com/office/drawing/2014/main" id="{EA6205B6-A1DB-4CBF-A06D-3428120DB0ED}"/>
+          <p:cNvPr id="3" name="TextBox 2">
+            <a:extLst>
+              <a:ext uri="{FF2B5EF4-FFF2-40B4-BE49-F238E27FC236}">
+                <a16:creationId xmlns:a16="http://schemas.microsoft.com/office/drawing/2014/main" id="{192900FA-7C08-4099-9B94-B3792A9A4C49}"/>
               </a:ext>
             </a:extLst>
           </p:cNvPr>
@@ -7244,8 +7648,8 @@
         </p:nvSpPr>
         <p:spPr>
           <a:xfrm>
-            <a:off x="633663" y="1461525"/>
-            <a:ext cx="10924674" cy="1107996"/>
+            <a:off x="697831" y="1078952"/>
+            <a:ext cx="10170695" cy="1938992"/>
           </a:xfrm>
           <a:prstGeom prst="rect">
             <a:avLst/>
@@ -7258,70 +7662,40 @@
           </a:bodyPr>
           <a:lstStyle/>
           <a:p>
-            <a:pPr marL="285750" indent="-285750">
-              <a:buFont typeface="Arial" panose="020B0604020202020204" pitchFamily="34" charset="0"/>
-              <a:buChar char="•"/>
+            <a:pPr marL="514350" indent="-514350">
+              <a:buFont typeface="+mj-lt"/>
+              <a:buAutoNum type="arabicPeriod" startAt="3"/>
             </a:pPr>
             <a:r>
-              <a:rPr lang="en-US" sz="2200" dirty="0"/>
-              <a:t>First a Blockchain transaction is created and asymmetrically encrypted</a:t>
-            </a:r>
-          </a:p>
-          <a:p>
-            <a:pPr marL="285750" indent="-285750">
-              <a:buFont typeface="Arial" panose="020B0604020202020204" pitchFamily="34" charset="0"/>
-              <a:buChar char="•"/>
+              <a:rPr lang="en-US" sz="3000" dirty="0"/>
+              <a:t>The transaction is verified by the decentralized community of “miners”.</a:t>
+            </a:r>
+          </a:p>
+          <a:p>
+            <a:pPr marL="514350" indent="-514350">
+              <a:buFont typeface="+mj-lt"/>
+              <a:buAutoNum type="arabicPeriod" startAt="3"/>
             </a:pPr>
-            <a:endParaRPr lang="en-US" sz="2200" dirty="0"/>
-          </a:p>
-          <a:p>
-            <a:pPr marL="285750" indent="-285750">
-              <a:buFont typeface="Arial" panose="020B0604020202020204" pitchFamily="34" charset="0"/>
-              <a:buChar char="•"/>
+            <a:endParaRPr lang="en-US" sz="3000" dirty="0"/>
+          </a:p>
+          <a:p>
+            <a:pPr marL="514350" indent="-514350">
+              <a:buFont typeface="+mj-lt"/>
+              <a:buAutoNum type="arabicPeriod" startAt="3"/>
             </a:pPr>
             <a:r>
-              <a:rPr lang="en-US" sz="2200" dirty="0"/>
-              <a:t> Then the transaction is added to a transaction pool for validation</a:t>
-            </a:r>
-          </a:p>
-        </p:txBody>
-      </p:sp>
-      <p:pic>
-        <p:nvPicPr>
-          <p:cNvPr id="9" name="Picture 8">
-            <a:extLst>
-              <a:ext uri="{FF2B5EF4-FFF2-40B4-BE49-F238E27FC236}">
-                <a16:creationId xmlns:a16="http://schemas.microsoft.com/office/drawing/2014/main" id="{BFE46182-D74C-4C43-96FC-C6F4107C4843}"/>
-              </a:ext>
-            </a:extLst>
-          </p:cNvPr>
-          <p:cNvPicPr>
-            <a:picLocks noChangeAspect="1"/>
-          </p:cNvPicPr>
-          <p:nvPr/>
-        </p:nvPicPr>
-        <p:blipFill>
-          <a:blip r:embed="rId2"/>
-          <a:stretch>
-            <a:fillRect/>
-          </a:stretch>
-        </p:blipFill>
-        <p:spPr>
-          <a:xfrm>
-            <a:off x="1463107" y="2826954"/>
-            <a:ext cx="9405419" cy="2569521"/>
-          </a:xfrm>
-          <a:prstGeom prst="rect">
-            <a:avLst/>
-          </a:prstGeom>
-        </p:spPr>
-      </p:pic>
-      <p:sp>
-        <p:nvSpPr>
-          <p:cNvPr id="10" name="Arrow: Down 9">
-            <a:extLst>
-              <a:ext uri="{FF2B5EF4-FFF2-40B4-BE49-F238E27FC236}">
-                <a16:creationId xmlns:a16="http://schemas.microsoft.com/office/drawing/2014/main" id="{115C9850-AD4B-4E4A-8DCF-1E4A8F68A888}"/>
+              <a:rPr lang="en-US" sz="3000" dirty="0"/>
+              <a:t>The validated transaction is stored in a block.</a:t>
+            </a:r>
+          </a:p>
+        </p:txBody>
+      </p:sp>
+      <p:sp>
+        <p:nvSpPr>
+          <p:cNvPr id="13" name="Arrow: Down 12">
+            <a:extLst>
+              <a:ext uri="{FF2B5EF4-FFF2-40B4-BE49-F238E27FC236}">
+                <a16:creationId xmlns:a16="http://schemas.microsoft.com/office/drawing/2014/main" id="{54F0DDE8-B518-41E4-A7E1-EF8C81C49B05}"/>
               </a:ext>
             </a:extLst>
           </p:cNvPr>
@@ -7329,8 +7703,8 @@
           <p:nvPr/>
         </p:nvSpPr>
         <p:spPr>
-          <a:xfrm>
-            <a:off x="10250904" y="5550568"/>
+          <a:xfrm rot="16200000">
+            <a:off x="3136998" y="4425084"/>
             <a:ext cx="770021" cy="784534"/>
           </a:xfrm>
           <a:prstGeom prst="downArrow">
@@ -7370,10 +7744,128 @@
           </a:p>
         </p:txBody>
       </p:sp>
+      <p:sp>
+        <p:nvSpPr>
+          <p:cNvPr id="15" name="Footer Placeholder 5">
+            <a:extLst>
+              <a:ext uri="{FF2B5EF4-FFF2-40B4-BE49-F238E27FC236}">
+                <a16:creationId xmlns:a16="http://schemas.microsoft.com/office/drawing/2014/main" id="{499D194B-C283-45D5-AAA6-88F49CCDF5E6}"/>
+              </a:ext>
+            </a:extLst>
+          </p:cNvPr>
+          <p:cNvSpPr>
+            <a:spLocks noGrp="1"/>
+          </p:cNvSpPr>
+          <p:nvPr>
+            <p:ph type="ftr" sz="quarter" idx="11"/>
+          </p:nvPr>
+        </p:nvSpPr>
+        <p:spPr>
+          <a:xfrm>
+            <a:off x="228600" y="6356350"/>
+            <a:ext cx="7924800" cy="501650"/>
+          </a:xfrm>
+        </p:spPr>
+        <p:txBody>
+          <a:bodyPr/>
+          <a:lstStyle/>
+          <a:p>
+            <a:pPr algn="l"/>
+            <a:r>
+              <a:rPr lang="en-US" sz="1400" dirty="0"/>
+              <a:t>See reference [1]</a:t>
+            </a:r>
+          </a:p>
+        </p:txBody>
+      </p:sp>
+      <p:pic>
+        <p:nvPicPr>
+          <p:cNvPr id="5" name="Picture 4">
+            <a:extLst>
+              <a:ext uri="{FF2B5EF4-FFF2-40B4-BE49-F238E27FC236}">
+                <a16:creationId xmlns:a16="http://schemas.microsoft.com/office/drawing/2014/main" id="{5A3817E0-3098-462B-A865-195FDCF2B91D}"/>
+              </a:ext>
+            </a:extLst>
+          </p:cNvPr>
+          <p:cNvPicPr>
+            <a:picLocks noChangeAspect="1"/>
+          </p:cNvPicPr>
+          <p:nvPr/>
+        </p:nvPicPr>
+        <p:blipFill>
+          <a:blip r:embed="rId2"/>
+          <a:stretch>
+            <a:fillRect/>
+          </a:stretch>
+        </p:blipFill>
+        <p:spPr>
+          <a:xfrm>
+            <a:off x="4226917" y="3188911"/>
+            <a:ext cx="3481491" cy="3256879"/>
+          </a:xfrm>
+          <a:prstGeom prst="rect">
+            <a:avLst/>
+          </a:prstGeom>
+        </p:spPr>
+      </p:pic>
+      <p:sp>
+        <p:nvSpPr>
+          <p:cNvPr id="16" name="Arrow: Down 15">
+            <a:extLst>
+              <a:ext uri="{FF2B5EF4-FFF2-40B4-BE49-F238E27FC236}">
+                <a16:creationId xmlns:a16="http://schemas.microsoft.com/office/drawing/2014/main" id="{5A11DDCA-7954-4D49-A32B-46AD2914651F}"/>
+              </a:ext>
+            </a:extLst>
+          </p:cNvPr>
+          <p:cNvSpPr/>
+          <p:nvPr/>
+        </p:nvSpPr>
+        <p:spPr>
+          <a:xfrm rot="16200000">
+            <a:off x="8246410" y="4425083"/>
+            <a:ext cx="770021" cy="784534"/>
+          </a:xfrm>
+          <a:prstGeom prst="downArrow">
+            <a:avLst/>
+          </a:prstGeom>
+          <a:solidFill>
+            <a:schemeClr val="tx1"/>
+          </a:solidFill>
+          <a:ln>
+            <a:solidFill>
+              <a:schemeClr val="tx1"/>
+            </a:solidFill>
+          </a:ln>
+        </p:spPr>
+        <p:style>
+          <a:lnRef idx="2">
+            <a:schemeClr val="accent1">
+              <a:shade val="50000"/>
+            </a:schemeClr>
+          </a:lnRef>
+          <a:fillRef idx="1">
+            <a:schemeClr val="accent1"/>
+          </a:fillRef>
+          <a:effectRef idx="0">
+            <a:schemeClr val="accent1"/>
+          </a:effectRef>
+          <a:fontRef idx="minor">
+            <a:schemeClr val="lt1"/>
+          </a:fontRef>
+        </p:style>
+        <p:txBody>
+          <a:bodyPr rtlCol="0" anchor="ctr"/>
+          <a:lstStyle/>
+          <a:p>
+            <a:pPr algn="ctr"/>
+            <a:endParaRPr lang="en-US"/>
+          </a:p>
+        </p:txBody>
+      </p:sp>
     </p:spTree>
     <p:extLst>
       <p:ext uri="{BB962C8B-B14F-4D97-AF65-F5344CB8AC3E}">
-        <p14:creationId xmlns:p14="http://schemas.microsoft.com/office/powerpoint/2010/main" val="3912653021"/>
+        <p14:creationId xmlns:p14="http://schemas.microsoft.com/office/powerpoint/2010/main" val="2636958278"/>
       </p:ext>
     </p:extLst>
   </p:cSld>
@@ -7498,8 +7990,8 @@
         </p:nvSpPr>
         <p:spPr>
           <a:xfrm>
-            <a:off x="228600" y="-3399"/>
-            <a:ext cx="11734800" cy="1163395"/>
+            <a:off x="228600" y="-31099"/>
+            <a:ext cx="11734800" cy="1218795"/>
           </a:xfrm>
           <a:prstGeom prst="rect">
             <a:avLst/>
@@ -7542,7 +8034,7 @@
           <a:p>
             <a:pPr algn="ctr"/>
             <a:r>
-              <a:rPr lang="en-US" sz="2800" b="1" dirty="0">
+              <a:rPr lang="en-US" sz="3000" b="1" dirty="0">
                 <a:solidFill>
                   <a:schemeClr val="tx1">
                     <a:lumMod val="75000"/>
@@ -7550,10 +8042,10 @@
                   </a:schemeClr>
                 </a:solidFill>
               </a:rPr>
-              <a:t>Blockchain Walkthrough Pt 2</a:t>
+              <a:t>Blockchain Walkthrough Pt 3</a:t>
             </a:r>
             <a:br>
-              <a:rPr lang="en-US" sz="2800" dirty="0">
+              <a:rPr lang="en-US" sz="3000" dirty="0">
                 <a:solidFill>
                   <a:schemeClr val="tx1">
                     <a:lumMod val="75000"/>
@@ -7562,7 +8054,7 @@
                 </a:solidFill>
               </a:rPr>
             </a:br>
-            <a:endParaRPr lang="en-US" sz="2800" dirty="0">
+            <a:endParaRPr lang="en-US" sz="3000" dirty="0">
               <a:solidFill>
                 <a:schemeClr val="tx1">
                   <a:lumMod val="75000"/>
@@ -7624,10 +8116,66 @@
       </p:cxnSp>
       <p:sp>
         <p:nvSpPr>
-          <p:cNvPr id="10" name="Arrow: Down 9">
-            <a:extLst>
-              <a:ext uri="{FF2B5EF4-FFF2-40B4-BE49-F238E27FC236}">
-                <a16:creationId xmlns:a16="http://schemas.microsoft.com/office/drawing/2014/main" id="{115C9850-AD4B-4E4A-8DCF-1E4A8F68A888}"/>
+          <p:cNvPr id="3" name="TextBox 2">
+            <a:extLst>
+              <a:ext uri="{FF2B5EF4-FFF2-40B4-BE49-F238E27FC236}">
+                <a16:creationId xmlns:a16="http://schemas.microsoft.com/office/drawing/2014/main" id="{192900FA-7C08-4099-9B94-B3792A9A4C49}"/>
+              </a:ext>
+            </a:extLst>
+          </p:cNvPr>
+          <p:cNvSpPr txBox="1"/>
+          <p:nvPr/>
+        </p:nvSpPr>
+        <p:spPr>
+          <a:xfrm>
+            <a:off x="433136" y="915735"/>
+            <a:ext cx="11133221" cy="2400657"/>
+          </a:xfrm>
+          <a:prstGeom prst="rect">
+            <a:avLst/>
+          </a:prstGeom>
+          <a:noFill/>
+        </p:spPr>
+        <p:txBody>
+          <a:bodyPr wrap="square" rtlCol="0">
+            <a:spAutoFit/>
+          </a:bodyPr>
+          <a:lstStyle/>
+          <a:p>
+            <a:pPr marL="514350" indent="-514350">
+              <a:buFont typeface="+mj-lt"/>
+              <a:buAutoNum type="arabicPeriod" startAt="5"/>
+            </a:pPr>
+            <a:r>
+              <a:rPr lang="en-US" sz="3000" dirty="0"/>
+              <a:t>The miner creates the proof-of-work that can be used to validate the transaction.</a:t>
+            </a:r>
+          </a:p>
+          <a:p>
+            <a:pPr marL="514350" indent="-514350">
+              <a:buFont typeface="+mj-lt"/>
+              <a:buAutoNum type="arabicPeriod" startAt="5"/>
+            </a:pPr>
+            <a:endParaRPr lang="en-US" sz="3000" dirty="0"/>
+          </a:p>
+          <a:p>
+            <a:pPr marL="514350" indent="-514350">
+              <a:buFont typeface="+mj-lt"/>
+              <a:buAutoNum type="arabicPeriod" startAt="5"/>
+            </a:pPr>
+            <a:r>
+              <a:rPr lang="en-US" sz="3000" dirty="0"/>
+              <a:t>The block and proof-of-work are verified by the community and, if valid, added to the community’s distributed ledger.</a:t>
+            </a:r>
+          </a:p>
+        </p:txBody>
+      </p:sp>
+      <p:sp>
+        <p:nvSpPr>
+          <p:cNvPr id="13" name="Arrow: Down 12">
+            <a:extLst>
+              <a:ext uri="{FF2B5EF4-FFF2-40B4-BE49-F238E27FC236}">
+                <a16:creationId xmlns:a16="http://schemas.microsoft.com/office/drawing/2014/main" id="{428183F8-EE43-451A-A9FE-676C32A8E5D5}"/>
               </a:ext>
             </a:extLst>
           </p:cNvPr>
@@ -7635,9 +8183,9 @@
           <p:nvPr/>
         </p:nvSpPr>
         <p:spPr>
-          <a:xfrm>
-            <a:off x="9777662" y="2316103"/>
-            <a:ext cx="770021" cy="784534"/>
+          <a:xfrm rot="16200000">
+            <a:off x="425120" y="4388333"/>
+            <a:ext cx="770021" cy="946484"/>
           </a:xfrm>
           <a:prstGeom prst="downArrow">
             <a:avLst/>
@@ -7681,7 +8229,7 @@
           <p:cNvPr id="2" name="Picture 1">
             <a:extLst>
               <a:ext uri="{FF2B5EF4-FFF2-40B4-BE49-F238E27FC236}">
-                <a16:creationId xmlns:a16="http://schemas.microsoft.com/office/drawing/2014/main" id="{78716FE9-5B48-4DEF-93D9-2F148C3254CF}"/>
+                <a16:creationId xmlns:a16="http://schemas.microsoft.com/office/drawing/2014/main" id="{D4290067-7EF0-42D8-B4D5-C1FC7022AE79}"/>
               </a:ext>
             </a:extLst>
           </p:cNvPr>
@@ -7698,8 +8246,8 @@
         </p:blipFill>
         <p:spPr>
           <a:xfrm>
-            <a:off x="1732548" y="3123210"/>
-            <a:ext cx="8726904" cy="2819055"/>
+            <a:off x="1402427" y="3801485"/>
+            <a:ext cx="9295262" cy="2216972"/>
           </a:xfrm>
           <a:prstGeom prst="rect">
             <a:avLst/>
@@ -7708,10 +8256,10 @@
       </p:pic>
       <p:sp>
         <p:nvSpPr>
-          <p:cNvPr id="12" name="Arrow: Down 11">
-            <a:extLst>
-              <a:ext uri="{FF2B5EF4-FFF2-40B4-BE49-F238E27FC236}">
-                <a16:creationId xmlns:a16="http://schemas.microsoft.com/office/drawing/2014/main" id="{C47E0E69-E029-4227-A45A-9280BAF0E2BC}"/>
+          <p:cNvPr id="15" name="Arrow: Down 14">
+            <a:extLst>
+              <a:ext uri="{FF2B5EF4-FFF2-40B4-BE49-F238E27FC236}">
+                <a16:creationId xmlns:a16="http://schemas.microsoft.com/office/drawing/2014/main" id="{BAA8294B-5CFE-4781-A367-DE8263043B26}"/>
               </a:ext>
             </a:extLst>
           </p:cNvPr>
@@ -7719,9 +8267,9 @@
           <p:nvPr/>
         </p:nvSpPr>
         <p:spPr>
-          <a:xfrm>
-            <a:off x="1507957" y="6033517"/>
-            <a:ext cx="770021" cy="784534"/>
+          <a:xfrm rot="16200000">
+            <a:off x="10836440" y="4388333"/>
+            <a:ext cx="770021" cy="946484"/>
           </a:xfrm>
           <a:prstGeom prst="downArrow">
             <a:avLst/>
@@ -7760,69 +8308,10 @@
           </a:p>
         </p:txBody>
       </p:sp>
-      <p:sp>
-        <p:nvSpPr>
-          <p:cNvPr id="3" name="TextBox 2">
-            <a:extLst>
-              <a:ext uri="{FF2B5EF4-FFF2-40B4-BE49-F238E27FC236}">
-                <a16:creationId xmlns:a16="http://schemas.microsoft.com/office/drawing/2014/main" id="{192900FA-7C08-4099-9B94-B3792A9A4C49}"/>
-              </a:ext>
-            </a:extLst>
-          </p:cNvPr>
-          <p:cNvSpPr txBox="1"/>
-          <p:nvPr/>
-        </p:nvSpPr>
-        <p:spPr>
-          <a:xfrm>
-            <a:off x="433137" y="915735"/>
-            <a:ext cx="9111916" cy="1785104"/>
-          </a:xfrm>
-          <a:prstGeom prst="rect">
-            <a:avLst/>
-          </a:prstGeom>
-          <a:noFill/>
-        </p:spPr>
-        <p:txBody>
-          <a:bodyPr wrap="square" rtlCol="0">
-            <a:spAutoFit/>
-          </a:bodyPr>
-          <a:lstStyle/>
-          <a:p>
-            <a:pPr marL="285750" indent="-285750">
-              <a:buFont typeface="Arial" panose="020B0604020202020204" pitchFamily="34" charset="0"/>
-              <a:buChar char="•"/>
-            </a:pPr>
-            <a:r>
-              <a:rPr lang="en-US" sz="2200" dirty="0"/>
-              <a:t>The transaction is then verified by the decentralized community of “miners”</a:t>
-            </a:r>
-          </a:p>
-          <a:p>
-            <a:pPr marL="285750" indent="-285750">
-              <a:buFont typeface="Arial" panose="020B0604020202020204" pitchFamily="34" charset="0"/>
-              <a:buChar char="•"/>
-            </a:pPr>
-            <a:r>
-              <a:rPr lang="en-US" sz="2200" dirty="0"/>
-              <a:t>The validated transaction is stored in a block</a:t>
-            </a:r>
-          </a:p>
-          <a:p>
-            <a:pPr marL="285750" indent="-285750">
-              <a:buFont typeface="Arial" panose="020B0604020202020204" pitchFamily="34" charset="0"/>
-              <a:buChar char="•"/>
-            </a:pPr>
-            <a:r>
-              <a:rPr lang="en-US" sz="2200" dirty="0"/>
-              <a:t>The miner that validated the transaction creates a “nonce”, the proof-of-work that can be used to validate the transaction.</a:t>
-            </a:r>
-          </a:p>
-        </p:txBody>
-      </p:sp>
     </p:spTree>
     <p:extLst>
       <p:ext uri="{BB962C8B-B14F-4D97-AF65-F5344CB8AC3E}">
-        <p14:creationId xmlns:p14="http://schemas.microsoft.com/office/powerpoint/2010/main" val="2636958278"/>
+        <p14:creationId xmlns:p14="http://schemas.microsoft.com/office/powerpoint/2010/main" val="1294866988"/>
       </p:ext>
     </p:extLst>
   </p:cSld>
@@ -7947,8 +8436,8 @@
         </p:nvSpPr>
         <p:spPr>
           <a:xfrm>
-            <a:off x="228600" y="-3399"/>
-            <a:ext cx="11734800" cy="1163395"/>
+            <a:off x="228600" y="-31099"/>
+            <a:ext cx="11734800" cy="1218795"/>
           </a:xfrm>
           <a:prstGeom prst="rect">
             <a:avLst/>
@@ -7991,7 +8480,7 @@
           <a:p>
             <a:pPr algn="ctr"/>
             <a:r>
-              <a:rPr lang="en-US" sz="2800" b="1" dirty="0">
+              <a:rPr lang="en-US" sz="3000" b="1" dirty="0">
                 <a:solidFill>
                   <a:schemeClr val="tx1">
                     <a:lumMod val="75000"/>
@@ -7999,10 +8488,10 @@
                   </a:schemeClr>
                 </a:solidFill>
               </a:rPr>
-              <a:t>Blockchain Walkthrough Pt 3</a:t>
+              <a:t>Blockchain Walkthrough Pt 4</a:t>
             </a:r>
             <a:br>
-              <a:rPr lang="en-US" sz="2800" dirty="0">
+              <a:rPr lang="en-US" sz="3000" dirty="0">
                 <a:solidFill>
                   <a:schemeClr val="tx1">
                     <a:lumMod val="75000"/>
@@ -8011,7 +8500,7 @@
                 </a:solidFill>
               </a:rPr>
             </a:br>
-            <a:endParaRPr lang="en-US" sz="2800" dirty="0">
+            <a:endParaRPr lang="en-US" sz="3000" dirty="0">
               <a:solidFill>
                 <a:schemeClr val="tx1">
                   <a:lumMod val="75000"/>
@@ -8073,10 +8562,96 @@
       </p:cxnSp>
       <p:sp>
         <p:nvSpPr>
+          <p:cNvPr id="3" name="TextBox 2">
+            <a:extLst>
+              <a:ext uri="{FF2B5EF4-FFF2-40B4-BE49-F238E27FC236}">
+                <a16:creationId xmlns:a16="http://schemas.microsoft.com/office/drawing/2014/main" id="{192900FA-7C08-4099-9B94-B3792A9A4C49}"/>
+              </a:ext>
+            </a:extLst>
+          </p:cNvPr>
+          <p:cNvSpPr txBox="1"/>
+          <p:nvPr/>
+        </p:nvSpPr>
+        <p:spPr>
+          <a:xfrm>
+            <a:off x="417437" y="1159996"/>
+            <a:ext cx="10940716" cy="1938992"/>
+          </a:xfrm>
+          <a:prstGeom prst="rect">
+            <a:avLst/>
+          </a:prstGeom>
+          <a:noFill/>
+        </p:spPr>
+        <p:txBody>
+          <a:bodyPr wrap="square" rtlCol="0">
+            <a:spAutoFit/>
+          </a:bodyPr>
+          <a:lstStyle/>
+          <a:p>
+            <a:pPr marL="514350" indent="-514350">
+              <a:buFont typeface="+mj-lt"/>
+              <a:buAutoNum type="arabicPeriod" startAt="8"/>
+            </a:pPr>
+            <a:r>
+              <a:rPr lang="en-US" sz="3000" dirty="0"/>
+              <a:t>The recipient receives the result of the transaction.</a:t>
+            </a:r>
+          </a:p>
+          <a:p>
+            <a:pPr marL="514350" indent="-514350">
+              <a:buFont typeface="+mj-lt"/>
+              <a:buAutoNum type="arabicPeriod" startAt="8"/>
+            </a:pPr>
+            <a:endParaRPr lang="en-US" sz="3000" dirty="0"/>
+          </a:p>
+          <a:p>
+            <a:pPr marL="514350" indent="-514350">
+              <a:buFont typeface="+mj-lt"/>
+              <a:buAutoNum type="arabicPeriod" startAt="8"/>
+            </a:pPr>
+            <a:r>
+              <a:rPr lang="en-US" sz="3000" dirty="0"/>
+              <a:t>The miner that validated the block and generated the proof-of-work receives a reward.</a:t>
+            </a:r>
+          </a:p>
+        </p:txBody>
+      </p:sp>
+      <p:pic>
+        <p:nvPicPr>
+          <p:cNvPr id="5" name="Picture 4">
+            <a:extLst>
+              <a:ext uri="{FF2B5EF4-FFF2-40B4-BE49-F238E27FC236}">
+                <a16:creationId xmlns:a16="http://schemas.microsoft.com/office/drawing/2014/main" id="{774E8CE7-EF2C-4BFB-8830-26DFC2E65024}"/>
+              </a:ext>
+            </a:extLst>
+          </p:cNvPr>
+          <p:cNvPicPr>
+            <a:picLocks noChangeAspect="1"/>
+          </p:cNvPicPr>
+          <p:nvPr/>
+        </p:nvPicPr>
+        <p:blipFill>
+          <a:blip r:embed="rId2"/>
+          <a:stretch>
+            <a:fillRect/>
+          </a:stretch>
+        </p:blipFill>
+        <p:spPr>
+          <a:xfrm>
+            <a:off x="4083640" y="3098988"/>
+            <a:ext cx="3295727" cy="3380961"/>
+          </a:xfrm>
+          <a:prstGeom prst="rect">
+            <a:avLst/>
+          </a:prstGeom>
+        </p:spPr>
+      </p:pic>
+      <p:sp>
+        <p:nvSpPr>
           <p:cNvPr id="10" name="Arrow: Down 9">
             <a:extLst>
               <a:ext uri="{FF2B5EF4-FFF2-40B4-BE49-F238E27FC236}">
-                <a16:creationId xmlns:a16="http://schemas.microsoft.com/office/drawing/2014/main" id="{115C9850-AD4B-4E4A-8DCF-1E4A8F68A888}"/>
+                <a16:creationId xmlns:a16="http://schemas.microsoft.com/office/drawing/2014/main" id="{CE5B9E3A-009F-4D45-8A61-69679144D24A}"/>
               </a:ext>
             </a:extLst>
           </p:cNvPr>
@@ -8084,9 +8659,9 @@
           <p:nvPr/>
         </p:nvSpPr>
         <p:spPr>
-          <a:xfrm>
-            <a:off x="2117558" y="1882005"/>
-            <a:ext cx="598821" cy="527369"/>
+          <a:xfrm rot="16200000">
+            <a:off x="3225386" y="4447673"/>
+            <a:ext cx="770021" cy="946484"/>
           </a:xfrm>
           <a:prstGeom prst="downArrow">
             <a:avLst/>
@@ -8125,133 +8700,10 @@
           </a:p>
         </p:txBody>
       </p:sp>
-      <p:sp>
-        <p:nvSpPr>
-          <p:cNvPr id="12" name="Arrow: Down 11">
-            <a:extLst>
-              <a:ext uri="{FF2B5EF4-FFF2-40B4-BE49-F238E27FC236}">
-                <a16:creationId xmlns:a16="http://schemas.microsoft.com/office/drawing/2014/main" id="{C47E0E69-E029-4227-A45A-9280BAF0E2BC}"/>
-              </a:ext>
-            </a:extLst>
-          </p:cNvPr>
-          <p:cNvSpPr/>
-          <p:nvPr/>
-        </p:nvSpPr>
-        <p:spPr>
-          <a:xfrm>
-            <a:off x="8598568" y="6094169"/>
-            <a:ext cx="609602" cy="651537"/>
-          </a:xfrm>
-          <a:prstGeom prst="downArrow">
-            <a:avLst/>
-          </a:prstGeom>
-          <a:solidFill>
-            <a:schemeClr val="tx1"/>
-          </a:solidFill>
-          <a:ln>
-            <a:solidFill>
-              <a:schemeClr val="tx1"/>
-            </a:solidFill>
-          </a:ln>
-        </p:spPr>
-        <p:style>
-          <a:lnRef idx="2">
-            <a:schemeClr val="accent1">
-              <a:shade val="50000"/>
-            </a:schemeClr>
-          </a:lnRef>
-          <a:fillRef idx="1">
-            <a:schemeClr val="accent1"/>
-          </a:fillRef>
-          <a:effectRef idx="0">
-            <a:schemeClr val="accent1"/>
-          </a:effectRef>
-          <a:fontRef idx="minor">
-            <a:schemeClr val="lt1"/>
-          </a:fontRef>
-        </p:style>
-        <p:txBody>
-          <a:bodyPr rtlCol="0" anchor="ctr"/>
-          <a:lstStyle/>
-          <a:p>
-            <a:pPr algn="ctr"/>
-            <a:endParaRPr lang="en-US"/>
-          </a:p>
-        </p:txBody>
-      </p:sp>
-      <p:sp>
-        <p:nvSpPr>
-          <p:cNvPr id="3" name="TextBox 2">
-            <a:extLst>
-              <a:ext uri="{FF2B5EF4-FFF2-40B4-BE49-F238E27FC236}">
-                <a16:creationId xmlns:a16="http://schemas.microsoft.com/office/drawing/2014/main" id="{192900FA-7C08-4099-9B94-B3792A9A4C49}"/>
-              </a:ext>
-            </a:extLst>
-          </p:cNvPr>
-          <p:cNvSpPr txBox="1"/>
-          <p:nvPr/>
-        </p:nvSpPr>
-        <p:spPr>
-          <a:xfrm>
-            <a:off x="433137" y="915735"/>
-            <a:ext cx="9111916" cy="769441"/>
-          </a:xfrm>
-          <a:prstGeom prst="rect">
-            <a:avLst/>
-          </a:prstGeom>
-          <a:noFill/>
-        </p:spPr>
-        <p:txBody>
-          <a:bodyPr wrap="square" rtlCol="0">
-            <a:spAutoFit/>
-          </a:bodyPr>
-          <a:lstStyle/>
-          <a:p>
-            <a:pPr marL="285750" indent="-285750">
-              <a:buFont typeface="Arial" panose="020B0604020202020204" pitchFamily="34" charset="0"/>
-              <a:buChar char="•"/>
-            </a:pPr>
-            <a:r>
-              <a:rPr lang="en-US" sz="2200" dirty="0"/>
-              <a:t>The black and nonce are verified by the community and, if valid, added to the community’s distributed ledger.</a:t>
-            </a:r>
-          </a:p>
-        </p:txBody>
-      </p:sp>
-      <p:pic>
-        <p:nvPicPr>
-          <p:cNvPr id="5" name="Picture 4">
-            <a:extLst>
-              <a:ext uri="{FF2B5EF4-FFF2-40B4-BE49-F238E27FC236}">
-                <a16:creationId xmlns:a16="http://schemas.microsoft.com/office/drawing/2014/main" id="{AFEF0E5D-AA0D-4DE9-8D16-B62A7F0BA555}"/>
-              </a:ext>
-            </a:extLst>
-          </p:cNvPr>
-          <p:cNvPicPr>
-            <a:picLocks noChangeAspect="1"/>
-          </p:cNvPicPr>
-          <p:nvPr/>
-        </p:nvPicPr>
-        <p:blipFill>
-          <a:blip r:embed="rId2"/>
-          <a:stretch>
-            <a:fillRect/>
-          </a:stretch>
-        </p:blipFill>
-        <p:spPr>
-          <a:xfrm>
-            <a:off x="2117558" y="2422850"/>
-            <a:ext cx="7716253" cy="3595211"/>
-          </a:xfrm>
-          <a:prstGeom prst="rect">
-            <a:avLst/>
-          </a:prstGeom>
-        </p:spPr>
-      </p:pic>
     </p:spTree>
     <p:extLst>
       <p:ext uri="{BB962C8B-B14F-4D97-AF65-F5344CB8AC3E}">
-        <p14:creationId xmlns:p14="http://schemas.microsoft.com/office/powerpoint/2010/main" val="1294866988"/>
+        <p14:creationId xmlns:p14="http://schemas.microsoft.com/office/powerpoint/2010/main" val="2875634089"/>
       </p:ext>
     </p:extLst>
   </p:cSld>
@@ -8376,8 +8828,8 @@
         </p:nvSpPr>
         <p:spPr>
           <a:xfrm>
-            <a:off x="228600" y="-3399"/>
-            <a:ext cx="11734800" cy="1163395"/>
+            <a:off x="228600" y="370549"/>
+            <a:ext cx="11734800" cy="415498"/>
           </a:xfrm>
           <a:prstGeom prst="rect">
             <a:avLst/>
@@ -8408,19 +8860,8 @@
           </a:lstStyle>
           <a:p>
             <a:pPr algn="ctr"/>
-            <a:endParaRPr lang="en-US" sz="2800" b="1" dirty="0">
-              <a:solidFill>
-                <a:schemeClr val="tx1">
-                  <a:lumMod val="75000"/>
-                  <a:lumOff val="25000"/>
-                </a:schemeClr>
-              </a:solidFill>
-            </a:endParaRPr>
-          </a:p>
-          <a:p>
-            <a:pPr algn="ctr"/>
-            <a:r>
-              <a:rPr lang="en-US" sz="2800" b="1" dirty="0">
+            <a:r>
+              <a:rPr lang="en-US" sz="3000" b="1" dirty="0">
                 <a:solidFill>
                   <a:schemeClr val="tx1">
                     <a:lumMod val="75000"/>
@@ -8428,19 +8869,9 @@
                   </a:schemeClr>
                 </a:solidFill>
               </a:rPr>
-              <a:t>Blockchain Walkthrough Pt 4</a:t>
-            </a:r>
-            <a:br>
-              <a:rPr lang="en-US" sz="2800" dirty="0">
-                <a:solidFill>
-                  <a:schemeClr val="tx1">
-                    <a:lumMod val="75000"/>
-                    <a:lumOff val="25000"/>
-                  </a:schemeClr>
-                </a:solidFill>
-              </a:rPr>
-            </a:br>
-            <a:endParaRPr lang="en-US" sz="2800" dirty="0">
+              <a:t>BLOCKCHAIN APPLICATIONS</a:t>
+            </a:r>
+            <a:endParaRPr lang="en-US" sz="3000" dirty="0">
               <a:solidFill>
                 <a:schemeClr val="tx1">
                   <a:lumMod val="75000"/>
@@ -8502,60 +8933,6 @@
       </p:cxnSp>
       <p:sp>
         <p:nvSpPr>
-          <p:cNvPr id="12" name="Arrow: Down 11">
-            <a:extLst>
-              <a:ext uri="{FF2B5EF4-FFF2-40B4-BE49-F238E27FC236}">
-                <a16:creationId xmlns:a16="http://schemas.microsoft.com/office/drawing/2014/main" id="{C47E0E69-E029-4227-A45A-9280BAF0E2BC}"/>
-              </a:ext>
-            </a:extLst>
-          </p:cNvPr>
-          <p:cNvSpPr/>
-          <p:nvPr/>
-        </p:nvSpPr>
-        <p:spPr>
-          <a:xfrm>
-            <a:off x="8646695" y="2604310"/>
-            <a:ext cx="609602" cy="651537"/>
-          </a:xfrm>
-          <a:prstGeom prst="downArrow">
-            <a:avLst/>
-          </a:prstGeom>
-          <a:solidFill>
-            <a:schemeClr val="tx1"/>
-          </a:solidFill>
-          <a:ln>
-            <a:solidFill>
-              <a:schemeClr val="tx1"/>
-            </a:solidFill>
-          </a:ln>
-        </p:spPr>
-        <p:style>
-          <a:lnRef idx="2">
-            <a:schemeClr val="accent1">
-              <a:shade val="50000"/>
-            </a:schemeClr>
-          </a:lnRef>
-          <a:fillRef idx="1">
-            <a:schemeClr val="accent1"/>
-          </a:fillRef>
-          <a:effectRef idx="0">
-            <a:schemeClr val="accent1"/>
-          </a:effectRef>
-          <a:fontRef idx="minor">
-            <a:schemeClr val="lt1"/>
-          </a:fontRef>
-        </p:style>
-        <p:txBody>
-          <a:bodyPr rtlCol="0" anchor="ctr"/>
-          <a:lstStyle/>
-          <a:p>
-            <a:pPr algn="ctr"/>
-            <a:endParaRPr lang="en-US"/>
-          </a:p>
-        </p:txBody>
-      </p:sp>
-      <p:sp>
-        <p:nvSpPr>
           <p:cNvPr id="3" name="TextBox 2">
             <a:extLst>
               <a:ext uri="{FF2B5EF4-FFF2-40B4-BE49-F238E27FC236}">
@@ -8569,7 +8946,7 @@
         <p:spPr>
           <a:xfrm>
             <a:off x="417437" y="1159996"/>
-            <a:ext cx="10940716" cy="1107996"/>
+            <a:ext cx="10940716" cy="5170646"/>
           </a:xfrm>
           <a:prstGeom prst="rect">
             <a:avLst/>
@@ -8582,64 +8959,77 @@
           </a:bodyPr>
           <a:lstStyle/>
           <a:p>
-            <a:pPr marL="285750" indent="-285750">
-              <a:buFont typeface="Arial" panose="020B0604020202020204" pitchFamily="34" charset="0"/>
-              <a:buChar char="•"/>
+            <a:pPr marL="514350" indent="-514350">
+              <a:buFont typeface="+mj-lt"/>
+              <a:buAutoNum type="arabicPeriod"/>
             </a:pPr>
             <a:r>
-              <a:rPr lang="en-US" sz="2200" dirty="0"/>
-              <a:t>The recipient receives the result of the transaction (in this case, $50 for a charity)</a:t>
-            </a:r>
-          </a:p>
-          <a:p>
-            <a:endParaRPr lang="en-US" sz="2200" dirty="0"/>
-          </a:p>
-          <a:p>
-            <a:pPr marL="285750" indent="-285750">
-              <a:buFont typeface="Arial" panose="020B0604020202020204" pitchFamily="34" charset="0"/>
-              <a:buChar char="•"/>
+              <a:rPr lang="en-US" sz="3000" u="sng" dirty="0">
+                <a:hlinkClick r:id="rId2"/>
+              </a:rPr>
+              <a:t>Simply Vital Health</a:t>
+            </a:r>
+            <a:r>
+              <a:rPr lang="en-US" sz="3000" dirty="0"/>
+              <a:t> : A HIPAA compliant heath care solutions provider creating blockchain based applications for patient tracking and electronic health records</a:t>
+            </a:r>
+          </a:p>
+          <a:p>
+            <a:pPr marL="514350" indent="-514350">
+              <a:buFont typeface="+mj-lt"/>
+              <a:buAutoNum type="arabicPeriod"/>
             </a:pPr>
-            <a:r>
-              <a:rPr lang="en-US" sz="2200" dirty="0"/>
-              <a:t>The Miner that validated the block and generated the nonce receives a transaction fee.</a:t>
-            </a:r>
-          </a:p>
-        </p:txBody>
-      </p:sp>
-      <p:pic>
-        <p:nvPicPr>
-          <p:cNvPr id="2" name="Picture 1">
-            <a:extLst>
-              <a:ext uri="{FF2B5EF4-FFF2-40B4-BE49-F238E27FC236}">
-                <a16:creationId xmlns:a16="http://schemas.microsoft.com/office/drawing/2014/main" id="{32767627-C290-4CCD-9319-A4E7D18464B2}"/>
-              </a:ext>
-            </a:extLst>
-          </p:cNvPr>
-          <p:cNvPicPr>
-            <a:picLocks noChangeAspect="1"/>
-          </p:cNvPicPr>
-          <p:nvPr/>
-        </p:nvPicPr>
-        <p:blipFill>
-          <a:blip r:embed="rId2"/>
-          <a:stretch>
-            <a:fillRect/>
-          </a:stretch>
-        </p:blipFill>
-        <p:spPr>
-          <a:xfrm>
-            <a:off x="1680469" y="3312079"/>
-            <a:ext cx="8414652" cy="2256910"/>
-          </a:xfrm>
-          <a:prstGeom prst="rect">
-            <a:avLst/>
-          </a:prstGeom>
-        </p:spPr>
-      </p:pic>
+            <a:endParaRPr lang="en-US" sz="3000" dirty="0"/>
+          </a:p>
+          <a:p>
+            <a:pPr marL="514350" indent="-514350">
+              <a:buFont typeface="+mj-lt"/>
+              <a:buAutoNum type="arabicPeriod"/>
+            </a:pPr>
+            <a:r>
+              <a:rPr lang="en-US" sz="3000" u="sng" dirty="0">
+                <a:hlinkClick r:id="rId3"/>
+              </a:rPr>
+              <a:t>GEM</a:t>
+            </a:r>
+            <a:r>
+              <a:rPr lang="en-US" sz="3000" dirty="0"/>
+              <a:t>: Enterprise Blockchain Application involved with industries across the spectrum from tracking diseases on blockchain for the CDC to, tracking crypto investments, to building an operating system healthcare, GEMOS.</a:t>
+            </a:r>
+          </a:p>
+          <a:p>
+            <a:pPr marL="514350" indent="-514350">
+              <a:buFont typeface="+mj-lt"/>
+              <a:buAutoNum type="arabicPeriod"/>
+            </a:pPr>
+            <a:endParaRPr lang="en-US" sz="3000" dirty="0"/>
+          </a:p>
+          <a:p>
+            <a:pPr marL="514350" indent="-514350">
+              <a:buFont typeface="+mj-lt"/>
+              <a:buAutoNum type="arabicPeriod"/>
+            </a:pPr>
+            <a:r>
+              <a:rPr lang="en-US" sz="3000" dirty="0"/>
+              <a:t>Just in the past week </a:t>
+            </a:r>
+            <a:r>
+              <a:rPr lang="en-US" sz="3000" dirty="0">
+                <a:hlinkClick r:id="rId4"/>
+              </a:rPr>
+              <a:t>PayPal invested in Cambridge Blockchain </a:t>
+            </a:r>
+            <a:r>
+              <a:rPr lang="en-US" sz="3000" dirty="0"/>
+              <a:t>to start their shared ledger.</a:t>
+            </a:r>
+          </a:p>
+        </p:txBody>
+      </p:sp>
     </p:spTree>
     <p:extLst>
       <p:ext uri="{BB962C8B-B14F-4D97-AF65-F5344CB8AC3E}">
-        <p14:creationId xmlns:p14="http://schemas.microsoft.com/office/powerpoint/2010/main" val="2875634089"/>
+        <p14:creationId xmlns:p14="http://schemas.microsoft.com/office/powerpoint/2010/main" val="2465378440"/>
       </p:ext>
     </p:extLst>
   </p:cSld>

</xml_diff>

<commit_message>
added notes to presi, updated a link
</commit_message>
<xml_diff>
--- a/DS749 Project_Team 4_Blockchain Analysis.pptx
+++ b/DS749 Project_Team 4_Blockchain Analysis.pptx
@@ -242,7 +242,7 @@
           <a:p>
             <a:fld id="{21D3BC9C-6C58-464F-B94E-FD73C5FB016E}" type="datetimeFigureOut">
               <a:rPr lang="en-US" smtClean="0"/>
-              <a:t>4/8/2019</a:t>
+              <a:t>4/9/2019</a:t>
             </a:fld>
             <a:endParaRPr lang="en-US" dirty="0"/>
           </a:p>
@@ -553,6 +553,354 @@
           <a:bodyPr/>
           <a:lstStyle/>
           <a:p>
+            <a:pPr marL="171450" indent="-171450">
+              <a:buFontTx/>
+              <a:buChar char="-"/>
+            </a:pPr>
+            <a:r>
+              <a:rPr lang="en-US" sz="1200" b="1" i="0" kern="1200" dirty="0">
+                <a:solidFill>
+                  <a:schemeClr val="tx1"/>
+                </a:solidFill>
+                <a:effectLst/>
+                <a:latin typeface="+mn-lt"/>
+                <a:ea typeface="+mn-ea"/>
+                <a:cs typeface="+mn-cs"/>
+              </a:rPr>
+              <a:t>blind signature</a:t>
+            </a:r>
+            <a:r>
+              <a:rPr lang="en-US" sz="1200" b="0" i="0" kern="1200" dirty="0">
+                <a:solidFill>
+                  <a:schemeClr val="tx1"/>
+                </a:solidFill>
+                <a:effectLst/>
+                <a:latin typeface="+mn-lt"/>
+                <a:ea typeface="+mn-ea"/>
+                <a:cs typeface="+mn-cs"/>
+              </a:rPr>
+              <a:t>, as introduced by </a:t>
+            </a:r>
+            <a:r>
+              <a:rPr lang="en-US" sz="1200" b="0" i="0" u="none" strike="noStrike" kern="1200" dirty="0">
+                <a:solidFill>
+                  <a:schemeClr val="tx1"/>
+                </a:solidFill>
+                <a:effectLst/>
+                <a:latin typeface="+mn-lt"/>
+                <a:ea typeface="+mn-ea"/>
+                <a:cs typeface="+mn-cs"/>
+                <a:hlinkClick r:id="rId3" tooltip="David Chaum"/>
+              </a:rPr>
+              <a:t>David </a:t>
+            </a:r>
+            <a:r>
+              <a:rPr lang="en-US" sz="1200" b="0" i="0" u="none" strike="noStrike" kern="1200" dirty="0" err="1">
+                <a:solidFill>
+                  <a:schemeClr val="tx1"/>
+                </a:solidFill>
+                <a:effectLst/>
+                <a:latin typeface="+mn-lt"/>
+                <a:ea typeface="+mn-ea"/>
+                <a:cs typeface="+mn-cs"/>
+                <a:hlinkClick r:id="rId3" tooltip="David Chaum"/>
+              </a:rPr>
+              <a:t>Chaum</a:t>
+            </a:r>
+            <a:r>
+              <a:rPr lang="en-US" sz="1200" b="0" i="0" kern="1200" dirty="0">
+                <a:solidFill>
+                  <a:schemeClr val="tx1"/>
+                </a:solidFill>
+                <a:effectLst/>
+                <a:latin typeface="+mn-lt"/>
+                <a:ea typeface="+mn-ea"/>
+                <a:cs typeface="+mn-cs"/>
+              </a:rPr>
+              <a:t>,</a:t>
+            </a:r>
+            <a:r>
+              <a:rPr lang="en-US" sz="1200" b="0" i="0" u="none" strike="noStrike" kern="1200" baseline="30000" dirty="0">
+                <a:solidFill>
+                  <a:schemeClr val="tx1"/>
+                </a:solidFill>
+                <a:effectLst/>
+                <a:latin typeface="+mn-lt"/>
+                <a:ea typeface="+mn-ea"/>
+                <a:cs typeface="+mn-cs"/>
+                <a:hlinkClick r:id="rId4"/>
+              </a:rPr>
+              <a:t>[1]</a:t>
+            </a:r>
+            <a:r>
+              <a:rPr lang="en-US" sz="1200" b="0" i="0" kern="1200" dirty="0">
+                <a:solidFill>
+                  <a:schemeClr val="tx1"/>
+                </a:solidFill>
+                <a:effectLst/>
+                <a:latin typeface="+mn-lt"/>
+                <a:ea typeface="+mn-ea"/>
+                <a:cs typeface="+mn-cs"/>
+              </a:rPr>
+              <a:t> is a form of </a:t>
+            </a:r>
+            <a:r>
+              <a:rPr lang="en-US" sz="1200" b="0" i="0" u="none" strike="noStrike" kern="1200" dirty="0">
+                <a:solidFill>
+                  <a:schemeClr val="tx1"/>
+                </a:solidFill>
+                <a:effectLst/>
+                <a:latin typeface="+mn-lt"/>
+                <a:ea typeface="+mn-ea"/>
+                <a:cs typeface="+mn-cs"/>
+                <a:hlinkClick r:id="rId5" tooltip="Digital signature"/>
+              </a:rPr>
+              <a:t>digital signature</a:t>
+            </a:r>
+            <a:r>
+              <a:rPr lang="en-US" sz="1200" b="0" i="0" kern="1200" dirty="0">
+                <a:solidFill>
+                  <a:schemeClr val="tx1"/>
+                </a:solidFill>
+                <a:effectLst/>
+                <a:latin typeface="+mn-lt"/>
+                <a:ea typeface="+mn-ea"/>
+                <a:cs typeface="+mn-cs"/>
+              </a:rPr>
+              <a:t> in which the content of a message is disguised (</a:t>
+            </a:r>
+            <a:r>
+              <a:rPr lang="en-US" sz="1200" b="0" i="0" u="none" strike="noStrike" kern="1200" dirty="0">
+                <a:solidFill>
+                  <a:schemeClr val="tx1"/>
+                </a:solidFill>
+                <a:effectLst/>
+                <a:latin typeface="+mn-lt"/>
+                <a:ea typeface="+mn-ea"/>
+                <a:cs typeface="+mn-cs"/>
+                <a:hlinkClick r:id="rId6" tooltip="Blinding (cryptography)"/>
+              </a:rPr>
+              <a:t>blinded</a:t>
+            </a:r>
+            <a:r>
+              <a:rPr lang="en-US" sz="1200" b="0" i="0" kern="1200" dirty="0">
+                <a:solidFill>
+                  <a:schemeClr val="tx1"/>
+                </a:solidFill>
+                <a:effectLst/>
+                <a:latin typeface="+mn-lt"/>
+                <a:ea typeface="+mn-ea"/>
+                <a:cs typeface="+mn-cs"/>
+              </a:rPr>
+              <a:t>) before it is signed.  Used in voting and electronic cash systems.</a:t>
+            </a:r>
+          </a:p>
+          <a:p>
+            <a:pPr marL="171450" indent="-171450">
+              <a:buFontTx/>
+              <a:buChar char="-"/>
+            </a:pPr>
+            <a:r>
+              <a:rPr lang="en-US" sz="1200" b="0" i="0" kern="1200" dirty="0">
+                <a:solidFill>
+                  <a:schemeClr val="tx1"/>
+                </a:solidFill>
+                <a:effectLst/>
+                <a:latin typeface="+mn-lt"/>
+                <a:ea typeface="+mn-ea"/>
+                <a:cs typeface="+mn-cs"/>
+              </a:rPr>
+              <a:t>“When I purchase a magazine at a store and hand cash to the clerk, there is no need to know who I am.” </a:t>
+            </a:r>
+          </a:p>
+          <a:p>
+            <a:pPr marL="171450" indent="-171450">
+              <a:buFontTx/>
+              <a:buChar char="-"/>
+            </a:pPr>
+            <a:r>
+              <a:rPr lang="en-US" sz="1200" b="0" i="0" kern="1200" dirty="0">
+                <a:solidFill>
+                  <a:schemeClr val="tx1"/>
+                </a:solidFill>
+                <a:effectLst/>
+                <a:latin typeface="+mn-lt"/>
+                <a:ea typeface="+mn-ea"/>
+                <a:cs typeface="+mn-cs"/>
+              </a:rPr>
+              <a:t>“Therefore, privacy in an open society requires anonymous transaction systems. Until now, cash has been the primary such system. An anonymous transaction system is not a secret transaction system. When I ask my electronic mail provider to send and receive messages, my provider need not know to whom I am speaking or what I am saying or what others are saying to me; my provider only need know how to get the message there and how much I owe them in fees. When my identity is revealed by the underlying mechanism of the transaction, I have no privacy. ”</a:t>
+            </a:r>
+            <a:endParaRPr lang="en-US" dirty="0"/>
+          </a:p>
+        </p:txBody>
+      </p:sp>
+      <p:sp>
+        <p:nvSpPr>
+          <p:cNvPr id="4" name="Slide Number Placeholder 3"/>
+          <p:cNvSpPr>
+            <a:spLocks noGrp="1"/>
+          </p:cNvSpPr>
+          <p:nvPr>
+            <p:ph type="sldNum" sz="quarter" idx="5"/>
+          </p:nvPr>
+        </p:nvSpPr>
+        <p:spPr/>
+        <p:txBody>
+          <a:bodyPr/>
+          <a:lstStyle/>
+          <a:p>
+            <a:fld id="{BE60DC36-8EFA-4378-9855-E019C55AC472}" type="slidenum">
+              <a:rPr lang="en-US" smtClean="0"/>
+              <a:t>3</a:t>
+            </a:fld>
+            <a:endParaRPr lang="en-US" dirty="0"/>
+          </a:p>
+        </p:txBody>
+      </p:sp>
+    </p:spTree>
+    <p:extLst>
+      <p:ext uri="{BB962C8B-B14F-4D97-AF65-F5344CB8AC3E}">
+        <p14:creationId xmlns:p14="http://schemas.microsoft.com/office/powerpoint/2010/main" val="2196378416"/>
+      </p:ext>
+    </p:extLst>
+  </p:cSld>
+  <p:clrMapOvr>
+    <a:masterClrMapping/>
+  </p:clrMapOvr>
+</p:notes>
+</file>
+
+<file path=ppt/notesSlides/notesSlide2.xml><?xml version="1.0" encoding="utf-8"?>
+<p:notes xmlns:a="http://schemas.openxmlformats.org/drawingml/2006/main" xmlns:r="http://schemas.openxmlformats.org/officeDocument/2006/relationships" xmlns:p="http://schemas.openxmlformats.org/presentationml/2006/main">
+  <p:cSld>
+    <p:spTree>
+      <p:nvGrpSpPr>
+        <p:cNvPr id="1" name=""/>
+        <p:cNvGrpSpPr/>
+        <p:nvPr/>
+      </p:nvGrpSpPr>
+      <p:grpSpPr>
+        <a:xfrm>
+          <a:off x="0" y="0"/>
+          <a:ext cx="0" cy="0"/>
+          <a:chOff x="0" y="0"/>
+          <a:chExt cx="0" cy="0"/>
+        </a:xfrm>
+      </p:grpSpPr>
+      <p:sp>
+        <p:nvSpPr>
+          <p:cNvPr id="2" name="Slide Image Placeholder 1"/>
+          <p:cNvSpPr>
+            <a:spLocks noGrp="1" noRot="1" noChangeAspect="1"/>
+          </p:cNvSpPr>
+          <p:nvPr>
+            <p:ph type="sldImg"/>
+          </p:nvPr>
+        </p:nvSpPr>
+        <p:spPr/>
+      </p:sp>
+      <p:sp>
+        <p:nvSpPr>
+          <p:cNvPr id="3" name="Notes Placeholder 2"/>
+          <p:cNvSpPr>
+            <a:spLocks noGrp="1"/>
+          </p:cNvSpPr>
+          <p:nvPr>
+            <p:ph type="body" idx="1"/>
+          </p:nvPr>
+        </p:nvSpPr>
+        <p:spPr/>
+        <p:txBody>
+          <a:bodyPr/>
+          <a:lstStyle/>
+          <a:p>
+            <a:r>
+              <a:rPr lang="en-US" dirty="0"/>
+              <a:t>NBS (NSA) adopted the DES standard.  Diffie Helman in Exhaustive Cryptanalysis of the NBS Data Encryption Standard proposed a $20 million machine could crack DES in 12 hours using brute force.  Well within the means of governments at that time.</a:t>
+            </a:r>
+          </a:p>
+        </p:txBody>
+      </p:sp>
+      <p:sp>
+        <p:nvSpPr>
+          <p:cNvPr id="4" name="Slide Number Placeholder 3"/>
+          <p:cNvSpPr>
+            <a:spLocks noGrp="1"/>
+          </p:cNvSpPr>
+          <p:nvPr>
+            <p:ph type="sldNum" sz="quarter" idx="5"/>
+          </p:nvPr>
+        </p:nvSpPr>
+        <p:spPr/>
+        <p:txBody>
+          <a:bodyPr/>
+          <a:lstStyle/>
+          <a:p>
+            <a:fld id="{BE60DC36-8EFA-4378-9855-E019C55AC472}" type="slidenum">
+              <a:rPr lang="en-US" smtClean="0"/>
+              <a:t>4</a:t>
+            </a:fld>
+            <a:endParaRPr lang="en-US" dirty="0"/>
+          </a:p>
+        </p:txBody>
+      </p:sp>
+    </p:spTree>
+    <p:extLst>
+      <p:ext uri="{BB962C8B-B14F-4D97-AF65-F5344CB8AC3E}">
+        <p14:creationId xmlns:p14="http://schemas.microsoft.com/office/powerpoint/2010/main" val="822838668"/>
+      </p:ext>
+    </p:extLst>
+  </p:cSld>
+  <p:clrMapOvr>
+    <a:masterClrMapping/>
+  </p:clrMapOvr>
+</p:notes>
+</file>
+
+<file path=ppt/notesSlides/notesSlide3.xml><?xml version="1.0" encoding="utf-8"?>
+<p:notes xmlns:a="http://schemas.openxmlformats.org/drawingml/2006/main" xmlns:r="http://schemas.openxmlformats.org/officeDocument/2006/relationships" xmlns:p="http://schemas.openxmlformats.org/presentationml/2006/main">
+  <p:cSld>
+    <p:spTree>
+      <p:nvGrpSpPr>
+        <p:cNvPr id="1" name=""/>
+        <p:cNvGrpSpPr/>
+        <p:nvPr/>
+      </p:nvGrpSpPr>
+      <p:grpSpPr>
+        <a:xfrm>
+          <a:off x="0" y="0"/>
+          <a:ext cx="0" cy="0"/>
+          <a:chOff x="0" y="0"/>
+          <a:chExt cx="0" cy="0"/>
+        </a:xfrm>
+      </p:grpSpPr>
+      <p:sp>
+        <p:nvSpPr>
+          <p:cNvPr id="2" name="Slide Image Placeholder 1"/>
+          <p:cNvSpPr>
+            <a:spLocks noGrp="1" noRot="1" noChangeAspect="1"/>
+          </p:cNvSpPr>
+          <p:nvPr>
+            <p:ph type="sldImg"/>
+          </p:nvPr>
+        </p:nvSpPr>
+        <p:spPr/>
+      </p:sp>
+      <p:sp>
+        <p:nvSpPr>
+          <p:cNvPr id="3" name="Notes Placeholder 2"/>
+          <p:cNvSpPr>
+            <a:spLocks noGrp="1"/>
+          </p:cNvSpPr>
+          <p:nvPr>
+            <p:ph type="body" idx="1"/>
+          </p:nvPr>
+        </p:nvSpPr>
+        <p:spPr/>
+        <p:txBody>
+          <a:bodyPr/>
+          <a:lstStyle/>
+          <a:p>
             <a:pPr marL="285750" indent="-285750">
               <a:buFont typeface="Arial" panose="020B0604020202020204" pitchFamily="34" charset="0"/>
               <a:buChar char="•"/>
@@ -886,7 +1234,7 @@
           <a:p>
             <a:fld id="{40DA1498-92C7-4E4B-8045-C9195F453964}" type="datetimeFigureOut">
               <a:rPr lang="en-US" smtClean="0"/>
-              <a:t>4/8/2019</a:t>
+              <a:t>4/9/2019</a:t>
             </a:fld>
             <a:endParaRPr lang="en-US" dirty="0"/>
           </a:p>
@@ -1084,7 +1432,7 @@
           <a:p>
             <a:fld id="{40DA1498-92C7-4E4B-8045-C9195F453964}" type="datetimeFigureOut">
               <a:rPr lang="en-US" smtClean="0"/>
-              <a:t>4/8/2019</a:t>
+              <a:t>4/9/2019</a:t>
             </a:fld>
             <a:endParaRPr lang="en-US" dirty="0"/>
           </a:p>
@@ -1292,7 +1640,7 @@
           <a:p>
             <a:fld id="{40DA1498-92C7-4E4B-8045-C9195F453964}" type="datetimeFigureOut">
               <a:rPr lang="en-US" smtClean="0"/>
-              <a:t>4/8/2019</a:t>
+              <a:t>4/9/2019</a:t>
             </a:fld>
             <a:endParaRPr lang="en-US" dirty="0"/>
           </a:p>
@@ -1490,7 +1838,7 @@
           <a:p>
             <a:fld id="{40DA1498-92C7-4E4B-8045-C9195F453964}" type="datetimeFigureOut">
               <a:rPr lang="en-US" smtClean="0"/>
-              <a:t>4/8/2019</a:t>
+              <a:t>4/9/2019</a:t>
             </a:fld>
             <a:endParaRPr lang="en-US" dirty="0"/>
           </a:p>
@@ -1765,7 +2113,7 @@
           <a:p>
             <a:fld id="{40DA1498-92C7-4E4B-8045-C9195F453964}" type="datetimeFigureOut">
               <a:rPr lang="en-US" smtClean="0"/>
-              <a:t>4/8/2019</a:t>
+              <a:t>4/9/2019</a:t>
             </a:fld>
             <a:endParaRPr lang="en-US" dirty="0"/>
           </a:p>
@@ -2030,7 +2378,7 @@
           <a:p>
             <a:fld id="{40DA1498-92C7-4E4B-8045-C9195F453964}" type="datetimeFigureOut">
               <a:rPr lang="en-US" smtClean="0"/>
-              <a:t>4/8/2019</a:t>
+              <a:t>4/9/2019</a:t>
             </a:fld>
             <a:endParaRPr lang="en-US" dirty="0"/>
           </a:p>
@@ -2442,7 +2790,7 @@
           <a:p>
             <a:fld id="{40DA1498-92C7-4E4B-8045-C9195F453964}" type="datetimeFigureOut">
               <a:rPr lang="en-US" smtClean="0"/>
-              <a:t>4/8/2019</a:t>
+              <a:t>4/9/2019</a:t>
             </a:fld>
             <a:endParaRPr lang="en-US" dirty="0"/>
           </a:p>
@@ -2583,7 +2931,7 @@
           <a:p>
             <a:fld id="{40DA1498-92C7-4E4B-8045-C9195F453964}" type="datetimeFigureOut">
               <a:rPr lang="en-US" smtClean="0"/>
-              <a:t>4/8/2019</a:t>
+              <a:t>4/9/2019</a:t>
             </a:fld>
             <a:endParaRPr lang="en-US" dirty="0"/>
           </a:p>
@@ -2696,7 +3044,7 @@
           <a:p>
             <a:fld id="{40DA1498-92C7-4E4B-8045-C9195F453964}" type="datetimeFigureOut">
               <a:rPr lang="en-US" smtClean="0"/>
-              <a:t>4/8/2019</a:t>
+              <a:t>4/9/2019</a:t>
             </a:fld>
             <a:endParaRPr lang="en-US" dirty="0"/>
           </a:p>
@@ -3007,7 +3355,7 @@
           <a:p>
             <a:fld id="{40DA1498-92C7-4E4B-8045-C9195F453964}" type="datetimeFigureOut">
               <a:rPr lang="en-US" smtClean="0"/>
-              <a:t>4/8/2019</a:t>
+              <a:t>4/9/2019</a:t>
             </a:fld>
             <a:endParaRPr lang="en-US" dirty="0"/>
           </a:p>
@@ -3299,7 +3647,7 @@
           <a:p>
             <a:fld id="{40DA1498-92C7-4E4B-8045-C9195F453964}" type="datetimeFigureOut">
               <a:rPr lang="en-US" smtClean="0"/>
-              <a:t>4/8/2019</a:t>
+              <a:t>4/9/2019</a:t>
             </a:fld>
             <a:endParaRPr lang="en-US" dirty="0"/>
           </a:p>
@@ -3540,7 +3888,7 @@
           <a:p>
             <a:fld id="{40DA1498-92C7-4E4B-8045-C9195F453964}" type="datetimeFigureOut">
               <a:rPr lang="en-US" smtClean="0"/>
-              <a:t>4/8/2019</a:t>
+              <a:t>4/9/2019</a:t>
             </a:fld>
             <a:endParaRPr lang="en-US" dirty="0"/>
           </a:p>
@@ -6427,7 +6775,7 @@
         <p:spPr>
           <a:xfrm>
             <a:off x="228600" y="985810"/>
-            <a:ext cx="11364985" cy="5546327"/>
+            <a:ext cx="11364985" cy="5315494"/>
           </a:xfrm>
           <a:prstGeom prst="rect">
             <a:avLst/>
@@ -6455,6 +6803,7 @@
               <a:rPr lang="en-US" sz="3000" baseline="30000" dirty="0"/>
               <a:t> [3]</a:t>
             </a:r>
+            <a:endParaRPr lang="en-US" sz="3000" dirty="0"/>
           </a:p>
           <a:p>
             <a:pPr marL="342900" indent="-342900">
@@ -6464,7 +6813,22 @@
               <a:buFont typeface="Arial" panose="020B0604020202020204" pitchFamily="34" charset="0"/>
               <a:buChar char="•"/>
             </a:pPr>
-            <a:endParaRPr lang="en-US" sz="3000" dirty="0"/>
+            <a:r>
+              <a:rPr lang="en-US" sz="3000" dirty="0"/>
+              <a:t>Blockchain arose from research and communication of “</a:t>
+            </a:r>
+            <a:r>
+              <a:rPr lang="en-US" sz="3000" dirty="0" err="1"/>
+              <a:t>Cypherpunks</a:t>
+            </a:r>
+            <a:r>
+              <a:rPr lang="en-US" sz="3000" dirty="0"/>
+              <a:t>”, a rebellious technical community dedicated to building anonymous transaction systems.</a:t>
+            </a:r>
+            <a:r>
+              <a:rPr lang="en-US" sz="3000" baseline="30000" dirty="0"/>
+              <a:t> [3]</a:t>
+            </a:r>
           </a:p>
           <a:p>
             <a:pPr marL="342900" indent="-342900">
@@ -6475,32 +6839,12 @@
               <a:buChar char="•"/>
             </a:pPr>
             <a:r>
-              <a:rPr lang="en-US" sz="3000" dirty="0"/>
-              <a:t>Blockchain arose from research and communication of “</a:t>
-            </a:r>
-            <a:r>
-              <a:rPr lang="en-US" sz="3000" dirty="0" err="1"/>
-              <a:t>Cypherpunks</a:t>
-            </a:r>
-            <a:r>
-              <a:rPr lang="en-US" sz="3000" dirty="0"/>
-              <a:t>”, a rebellious technical community.</a:t>
-            </a:r>
-            <a:r>
-              <a:rPr lang="en-US" sz="3000" baseline="30000" dirty="0"/>
-              <a:t> [3]</a:t>
-            </a:r>
-            <a:endParaRPr lang="en-US" sz="3000" dirty="0"/>
-          </a:p>
-          <a:p>
-            <a:pPr marL="342900" indent="-342900">
-              <a:lnSpc>
-                <a:spcPct val="150000"/>
-              </a:lnSpc>
-              <a:buFont typeface="Arial" panose="020B0604020202020204" pitchFamily="34" charset="0"/>
-              <a:buChar char="•"/>
-            </a:pPr>
-            <a:endParaRPr lang="en-US" sz="3000" dirty="0"/>
+              <a:rPr lang="en-US" sz="2000" dirty="0">
+                <a:hlinkClick r:id="rId3"/>
+              </a:rPr>
+              <a:t>https://www.activism.net/cypherpunk/manifesto.html</a:t>
+            </a:r>
+            <a:endParaRPr lang="en-US" sz="2000" dirty="0"/>
           </a:p>
           <a:p>
             <a:pPr marL="285750" indent="-285750">
@@ -6789,7 +7133,7 @@
         <p:spPr>
           <a:xfrm>
             <a:off x="228600" y="757473"/>
-            <a:ext cx="11364985" cy="5546327"/>
+            <a:ext cx="11364985" cy="4853829"/>
           </a:xfrm>
           <a:prstGeom prst="rect">
             <a:avLst/>
@@ -6811,7 +7155,7 @@
             </a:pPr>
             <a:r>
               <a:rPr lang="en-US" sz="3000" dirty="0"/>
-              <a:t>DES only used easily-cracked 56-bit encryption keys, building mistrust in traditional encryption algorithms.</a:t>
+              <a:t>DES only used easily-cracked 56-bit encryption keys.</a:t>
             </a:r>
           </a:p>
           <a:p>
@@ -6822,7 +7166,10 @@
               <a:buFont typeface="Arial" panose="020B0604020202020204" pitchFamily="34" charset="0"/>
               <a:buChar char="•"/>
             </a:pPr>
-            <a:endParaRPr lang="en-US" sz="3000" dirty="0"/>
+            <a:r>
+              <a:rPr lang="en-US" sz="3000" dirty="0"/>
+              <a:t>Diffie –Helman proposed a $20 million in 12 hours, in 1977,   Suggested in a decade that could be $200K. </a:t>
+            </a:r>
           </a:p>
           <a:p>
             <a:pPr marL="342900" indent="-342900">
@@ -6846,14 +7193,6 @@
             </a:r>
           </a:p>
           <a:p>
-            <a:pPr>
-              <a:lnSpc>
-                <a:spcPct val="150000"/>
-              </a:lnSpc>
-            </a:pPr>
-            <a:endParaRPr lang="en-US" sz="3000" dirty="0"/>
-          </a:p>
-          <a:p>
             <a:pPr marL="342900" indent="-342900">
               <a:lnSpc>
                 <a:spcPct val="150000"/>
@@ -6863,7 +7202,7 @@
             </a:pPr>
             <a:r>
               <a:rPr lang="en-US" sz="3000" dirty="0"/>
-              <a:t>Bitcoin was the first cryptocurrency to establish trust and accountability without a central authority</a:t>
+              <a:t>Bitcoin was the first cryptocurrency to establish trust and accountability without a central authority and ensuring anonymity.</a:t>
             </a:r>
           </a:p>
         </p:txBody>

</xml_diff>